<commit_message>
control statements - if and match
</commit_message>
<xml_diff>
--- a/rust-lang.pptx
+++ b/rust-lang.pptx
@@ -23,6 +23,7 @@
     <p:sldId id="271" r:id="rId17"/>
     <p:sldId id="272" r:id="rId18"/>
     <p:sldId id="273" r:id="rId19"/>
+    <p:sldId id="274" r:id="rId20"/>
   </p:sldIdLst>
   <p:sldSz cx="12192000" cy="6858000"/>
   <p:notesSz cx="6858000" cy="9144000"/>
@@ -11939,6 +11940,532 @@
 <file path=ppt/slides/slide18.xml><?xml version="1.0" encoding="utf-8"?>
 <p:sld xmlns:a="http://schemas.openxmlformats.org/drawingml/2006/main" xmlns:r="http://schemas.openxmlformats.org/officeDocument/2006/relationships" xmlns:p="http://schemas.openxmlformats.org/presentationml/2006/main">
   <p:cSld>
+    <p:bg>
+      <p:bgPr>
+        <a:solidFill>
+          <a:schemeClr val="bg2"/>
+        </a:solidFill>
+        <a:effectLst/>
+      </p:bgPr>
+    </p:bg>
+    <p:spTree>
+      <p:nvGrpSpPr>
+        <p:cNvPr id="1" name=""/>
+        <p:cNvGrpSpPr/>
+        <p:nvPr/>
+      </p:nvGrpSpPr>
+      <p:grpSpPr>
+        <a:xfrm>
+          <a:off x="0" y="0"/>
+          <a:ext cx="0" cy="0"/>
+          <a:chOff x="0" y="0"/>
+          <a:chExt cx="0" cy="0"/>
+        </a:xfrm>
+      </p:grpSpPr>
+      <p:sp useBgFill="1">
+        <p:nvSpPr>
+          <p:cNvPr id="34" name="Rectangle 28">
+            <a:extLst>
+              <a:ext uri="{FF2B5EF4-FFF2-40B4-BE49-F238E27FC236}">
+                <a16:creationId xmlns:a16="http://schemas.microsoft.com/office/drawing/2014/main" id="{987A0FBA-CC04-4256-A8EB-BB3C543E989C}"/>
+              </a:ext>
+              <a:ext uri="{C183D7F6-B498-43B3-948B-1728B52AA6E4}">
+                <adec:decorative xmlns:adec="http://schemas.microsoft.com/office/drawing/2017/decorative" val="1"/>
+              </a:ext>
+            </a:extLst>
+          </p:cNvPr>
+          <p:cNvSpPr>
+            <a:spLocks noGrp="1" noRot="1" noChangeAspect="1" noMove="1" noResize="1" noEditPoints="1" noAdjustHandles="1" noChangeArrowheads="1" noChangeShapeType="1" noTextEdit="1"/>
+          </p:cNvSpPr>
+          <p:nvPr>
+            <p:extLst>
+              <p:ext uri="{386F3935-93C4-4BCD-93E2-E3B085C9AB24}">
+                <p16:designElem xmlns:p16="http://schemas.microsoft.com/office/powerpoint/2015/main" val="1"/>
+              </p:ext>
+            </p:extLst>
+          </p:nvPr>
+        </p:nvSpPr>
+        <p:spPr>
+          <a:xfrm>
+            <a:off x="0" y="0"/>
+            <a:ext cx="12192000" cy="6858000"/>
+          </a:xfrm>
+          <a:prstGeom prst="rect">
+            <a:avLst/>
+          </a:prstGeom>
+          <a:ln w="12700" cap="flat" cmpd="sng" algn="ctr">
+            <a:noFill/>
+            <a:prstDash val="solid"/>
+            <a:miter lim="800000"/>
+          </a:ln>
+          <a:effectLst/>
+          <a:extLst>
+            <a:ext uri="{91240B29-F687-4F45-9708-019B960494DF}">
+              <a14:hiddenLine xmlns:a14="http://schemas.microsoft.com/office/drawing/2010/main" w="12700" cap="flat" cmpd="sng" algn="ctr">
+                <a:solidFill>
+                  <a:schemeClr val="accent1">
+                    <a:shade val="50000"/>
+                  </a:schemeClr>
+                </a:solidFill>
+                <a:prstDash val="solid"/>
+                <a:miter lim="800000"/>
+              </a14:hiddenLine>
+            </a:ext>
+          </a:extLst>
+        </p:spPr>
+        <p:style>
+          <a:lnRef idx="2">
+            <a:schemeClr val="accent1">
+              <a:shade val="50000"/>
+            </a:schemeClr>
+          </a:lnRef>
+          <a:fillRef idx="1">
+            <a:schemeClr val="accent1"/>
+          </a:fillRef>
+          <a:effectRef idx="0">
+            <a:schemeClr val="accent1"/>
+          </a:effectRef>
+          <a:fontRef idx="minor">
+            <a:schemeClr val="lt1"/>
+          </a:fontRef>
+        </p:style>
+        <p:txBody>
+          <a:bodyPr rtlCol="0" anchor="ctr"/>
+          <a:lstStyle/>
+          <a:p>
+            <a:pPr algn="ctr"/>
+            <a:endParaRPr lang="en-US"/>
+          </a:p>
+        </p:txBody>
+      </p:sp>
+      <p:sp>
+        <p:nvSpPr>
+          <p:cNvPr id="35" name="Freeform: Shape 30">
+            <a:extLst>
+              <a:ext uri="{FF2B5EF4-FFF2-40B4-BE49-F238E27FC236}">
+                <a16:creationId xmlns:a16="http://schemas.microsoft.com/office/drawing/2014/main" id="{3D065C6D-EB42-400B-99C4-D0ACE936F6C3}"/>
+              </a:ext>
+              <a:ext uri="{C183D7F6-B498-43B3-948B-1728B52AA6E4}">
+                <adec:decorative xmlns:adec="http://schemas.microsoft.com/office/drawing/2017/decorative" val="1"/>
+              </a:ext>
+            </a:extLst>
+          </p:cNvPr>
+          <p:cNvSpPr>
+            <a:spLocks noGrp="1" noRot="1" noChangeAspect="1" noMove="1" noResize="1" noEditPoints="1" noAdjustHandles="1" noChangeArrowheads="1" noChangeShapeType="1" noTextEdit="1"/>
+          </p:cNvSpPr>
+          <p:nvPr>
+            <p:extLst>
+              <p:ext uri="{386F3935-93C4-4BCD-93E2-E3B085C9AB24}">
+                <p16:designElem xmlns:p16="http://schemas.microsoft.com/office/powerpoint/2015/main" val="1"/>
+              </p:ext>
+            </p:extLst>
+          </p:nvPr>
+        </p:nvSpPr>
+        <p:spPr>
+          <a:xfrm>
+            <a:off x="6613174" y="0"/>
+            <a:ext cx="5578824" cy="6028256"/>
+          </a:xfrm>
+          <a:custGeom>
+            <a:avLst/>
+            <a:gdLst>
+              <a:gd name="connsiteX0" fmla="*/ 1681218 w 5578824"/>
+              <a:gd name="connsiteY0" fmla="*/ 0 h 6028256"/>
+              <a:gd name="connsiteX1" fmla="*/ 5578824 w 5578824"/>
+              <a:gd name="connsiteY1" fmla="*/ 0 h 6028256"/>
+              <a:gd name="connsiteX2" fmla="*/ 5578824 w 5578824"/>
+              <a:gd name="connsiteY2" fmla="*/ 5760161 h 6028256"/>
+              <a:gd name="connsiteX3" fmla="*/ 5441231 w 5578824"/>
+              <a:gd name="connsiteY3" fmla="*/ 5804042 h 6028256"/>
+              <a:gd name="connsiteX4" fmla="*/ 4253224 w 5578824"/>
+              <a:gd name="connsiteY4" fmla="*/ 5980388 h 6028256"/>
+              <a:gd name="connsiteX5" fmla="*/ 837278 w 5578824"/>
+              <a:gd name="connsiteY5" fmla="*/ 4877588 h 6028256"/>
+              <a:gd name="connsiteX6" fmla="*/ 109626 w 5578824"/>
+              <a:gd name="connsiteY6" fmla="*/ 3329255 h 6028256"/>
+              <a:gd name="connsiteX7" fmla="*/ 156962 w 5578824"/>
+              <a:gd name="connsiteY7" fmla="*/ 1773839 h 6028256"/>
+              <a:gd name="connsiteX8" fmla="*/ 904890 w 5578824"/>
+              <a:gd name="connsiteY8" fmla="*/ 738354 h 6028256"/>
+              <a:gd name="connsiteX9" fmla="*/ 1304592 w 5578824"/>
+              <a:gd name="connsiteY9" fmla="*/ 360545 h 6028256"/>
+            </a:gdLst>
+            <a:ahLst/>
+            <a:cxnLst>
+              <a:cxn ang="0">
+                <a:pos x="connsiteX0" y="connsiteY0"/>
+              </a:cxn>
+              <a:cxn ang="0">
+                <a:pos x="connsiteX1" y="connsiteY1"/>
+              </a:cxn>
+              <a:cxn ang="0">
+                <a:pos x="connsiteX2" y="connsiteY2"/>
+              </a:cxn>
+              <a:cxn ang="0">
+                <a:pos x="connsiteX3" y="connsiteY3"/>
+              </a:cxn>
+              <a:cxn ang="0">
+                <a:pos x="connsiteX4" y="connsiteY4"/>
+              </a:cxn>
+              <a:cxn ang="0">
+                <a:pos x="connsiteX5" y="connsiteY5"/>
+              </a:cxn>
+              <a:cxn ang="0">
+                <a:pos x="connsiteX6" y="connsiteY6"/>
+              </a:cxn>
+              <a:cxn ang="0">
+                <a:pos x="connsiteX7" y="connsiteY7"/>
+              </a:cxn>
+              <a:cxn ang="0">
+                <a:pos x="connsiteX8" y="connsiteY8"/>
+              </a:cxn>
+              <a:cxn ang="0">
+                <a:pos x="connsiteX9" y="connsiteY9"/>
+              </a:cxn>
+            </a:cxnLst>
+            <a:rect l="l" t="t" r="r" b="b"/>
+            <a:pathLst>
+              <a:path w="5578824" h="6028256">
+                <a:moveTo>
+                  <a:pt x="1681218" y="0"/>
+                </a:moveTo>
+                <a:lnTo>
+                  <a:pt x="5578824" y="0"/>
+                </a:lnTo>
+                <a:lnTo>
+                  <a:pt x="5578824" y="5760161"/>
+                </a:lnTo>
+                <a:lnTo>
+                  <a:pt x="5441231" y="5804042"/>
+                </a:lnTo>
+                <a:cubicBezTo>
+                  <a:pt x="5079089" y="5907589"/>
+                  <a:pt x="4674877" y="5944442"/>
+                  <a:pt x="4253224" y="5980388"/>
+                </a:cubicBezTo>
+                <a:cubicBezTo>
+                  <a:pt x="2813852" y="6102970"/>
+                  <a:pt x="1551586" y="6071494"/>
+                  <a:pt x="837278" y="4877588"/>
+                </a:cubicBezTo>
+                <a:cubicBezTo>
+                  <a:pt x="529862" y="4363935"/>
+                  <a:pt x="255162" y="3847185"/>
+                  <a:pt x="109626" y="3329255"/>
+                </a:cubicBezTo>
+                <a:cubicBezTo>
+                  <a:pt x="-35907" y="2811325"/>
+                  <a:pt x="-52277" y="2292214"/>
+                  <a:pt x="156962" y="1773839"/>
+                </a:cubicBezTo>
+                <a:cubicBezTo>
+                  <a:pt x="296494" y="1428108"/>
+                  <a:pt x="536161" y="1082881"/>
+                  <a:pt x="904890" y="738354"/>
+                </a:cubicBezTo>
+                <a:cubicBezTo>
+                  <a:pt x="1036690" y="615181"/>
+                  <a:pt x="1169968" y="488910"/>
+                  <a:pt x="1304592" y="360545"/>
+                </a:cubicBezTo>
+                <a:close/>
+              </a:path>
+            </a:pathLst>
+          </a:custGeom>
+          <a:solidFill>
+            <a:schemeClr val="accent6"/>
+          </a:solidFill>
+          <a:ln>
+            <a:noFill/>
+          </a:ln>
+        </p:spPr>
+        <p:style>
+          <a:lnRef idx="2">
+            <a:schemeClr val="accent1">
+              <a:shade val="50000"/>
+            </a:schemeClr>
+          </a:lnRef>
+          <a:fillRef idx="1">
+            <a:schemeClr val="accent1"/>
+          </a:fillRef>
+          <a:effectRef idx="0">
+            <a:schemeClr val="accent1"/>
+          </a:effectRef>
+          <a:fontRef idx="minor">
+            <a:schemeClr val="lt1"/>
+          </a:fontRef>
+        </p:style>
+        <p:txBody>
+          <a:bodyPr wrap="square" rtlCol="0" anchor="ctr">
+            <a:noAutofit/>
+          </a:bodyPr>
+          <a:lstStyle/>
+          <a:p>
+            <a:pPr algn="ctr"/>
+            <a:endParaRPr lang="en-US"/>
+          </a:p>
+        </p:txBody>
+      </p:sp>
+      <p:sp>
+        <p:nvSpPr>
+          <p:cNvPr id="33" name="Freeform: Shape 32">
+            <a:extLst>
+              <a:ext uri="{FF2B5EF4-FFF2-40B4-BE49-F238E27FC236}">
+                <a16:creationId xmlns:a16="http://schemas.microsoft.com/office/drawing/2014/main" id="{3362A0EA-3E81-4464-94B8-70BE5870EDC0}"/>
+              </a:ext>
+              <a:ext uri="{C183D7F6-B498-43B3-948B-1728B52AA6E4}">
+                <adec:decorative xmlns:adec="http://schemas.microsoft.com/office/drawing/2017/decorative" val="1"/>
+              </a:ext>
+            </a:extLst>
+          </p:cNvPr>
+          <p:cNvSpPr>
+            <a:spLocks noGrp="1" noRot="1" noChangeAspect="1" noMove="1" noResize="1" noEditPoints="1" noAdjustHandles="1" noChangeArrowheads="1" noChangeShapeType="1" noTextEdit="1"/>
+          </p:cNvSpPr>
+          <p:nvPr>
+            <p:extLst>
+              <p:ext uri="{386F3935-93C4-4BCD-93E2-E3B085C9AB24}">
+                <p16:designElem xmlns:p16="http://schemas.microsoft.com/office/powerpoint/2015/main" val="1"/>
+              </p:ext>
+            </p:extLst>
+          </p:nvPr>
+        </p:nvSpPr>
+        <p:spPr>
+          <a:xfrm flipH="1">
+            <a:off x="6487883" y="0"/>
+            <a:ext cx="5704117" cy="6096000"/>
+          </a:xfrm>
+          <a:custGeom>
+            <a:avLst/>
+            <a:gdLst>
+              <a:gd name="connsiteX0" fmla="*/ 0 w 5704117"/>
+              <a:gd name="connsiteY0" fmla="*/ 0 h 6096000"/>
+              <a:gd name="connsiteX1" fmla="*/ 4562795 w 5704117"/>
+              <a:gd name="connsiteY1" fmla="*/ 0 h 6096000"/>
+              <a:gd name="connsiteX2" fmla="*/ 4721192 w 5704117"/>
+              <a:gd name="connsiteY2" fmla="*/ 133595 h 6096000"/>
+              <a:gd name="connsiteX3" fmla="*/ 5467522 w 5704117"/>
+              <a:gd name="connsiteY3" fmla="*/ 1054328 h 6096000"/>
+              <a:gd name="connsiteX4" fmla="*/ 5538873 w 5704117"/>
+              <a:gd name="connsiteY4" fmla="*/ 2897564 h 6096000"/>
+              <a:gd name="connsiteX5" fmla="*/ 4442050 w 5704117"/>
+              <a:gd name="connsiteY5" fmla="*/ 4732407 h 6096000"/>
+              <a:gd name="connsiteX6" fmla="*/ 93046 w 5704117"/>
+              <a:gd name="connsiteY6" fmla="*/ 6082857 h 6096000"/>
+              <a:gd name="connsiteX7" fmla="*/ 0 w 5704117"/>
+              <a:gd name="connsiteY7" fmla="*/ 6078450 h 6096000"/>
+              <a:gd name="connsiteX0" fmla="*/ 4562795 w 5704117"/>
+              <a:gd name="connsiteY0" fmla="*/ 0 h 6096000"/>
+              <a:gd name="connsiteX1" fmla="*/ 4721192 w 5704117"/>
+              <a:gd name="connsiteY1" fmla="*/ 133595 h 6096000"/>
+              <a:gd name="connsiteX2" fmla="*/ 5467522 w 5704117"/>
+              <a:gd name="connsiteY2" fmla="*/ 1054328 h 6096000"/>
+              <a:gd name="connsiteX3" fmla="*/ 5538873 w 5704117"/>
+              <a:gd name="connsiteY3" fmla="*/ 2897564 h 6096000"/>
+              <a:gd name="connsiteX4" fmla="*/ 4442050 w 5704117"/>
+              <a:gd name="connsiteY4" fmla="*/ 4732407 h 6096000"/>
+              <a:gd name="connsiteX5" fmla="*/ 93046 w 5704117"/>
+              <a:gd name="connsiteY5" fmla="*/ 6082857 h 6096000"/>
+              <a:gd name="connsiteX6" fmla="*/ 0 w 5704117"/>
+              <a:gd name="connsiteY6" fmla="*/ 6078450 h 6096000"/>
+              <a:gd name="connsiteX7" fmla="*/ 91440 w 5704117"/>
+              <a:gd name="connsiteY7" fmla="*/ 91440 h 6096000"/>
+              <a:gd name="connsiteX0" fmla="*/ 4562795 w 5704117"/>
+              <a:gd name="connsiteY0" fmla="*/ 0 h 6096000"/>
+              <a:gd name="connsiteX1" fmla="*/ 4721192 w 5704117"/>
+              <a:gd name="connsiteY1" fmla="*/ 133595 h 6096000"/>
+              <a:gd name="connsiteX2" fmla="*/ 5467522 w 5704117"/>
+              <a:gd name="connsiteY2" fmla="*/ 1054328 h 6096000"/>
+              <a:gd name="connsiteX3" fmla="*/ 5538873 w 5704117"/>
+              <a:gd name="connsiteY3" fmla="*/ 2897564 h 6096000"/>
+              <a:gd name="connsiteX4" fmla="*/ 4442050 w 5704117"/>
+              <a:gd name="connsiteY4" fmla="*/ 4732407 h 6096000"/>
+              <a:gd name="connsiteX5" fmla="*/ 93046 w 5704117"/>
+              <a:gd name="connsiteY5" fmla="*/ 6082857 h 6096000"/>
+              <a:gd name="connsiteX6" fmla="*/ 0 w 5704117"/>
+              <a:gd name="connsiteY6" fmla="*/ 6078450 h 6096000"/>
+            </a:gdLst>
+            <a:ahLst/>
+            <a:cxnLst>
+              <a:cxn ang="0">
+                <a:pos x="connsiteX0" y="connsiteY0"/>
+              </a:cxn>
+              <a:cxn ang="0">
+                <a:pos x="connsiteX1" y="connsiteY1"/>
+              </a:cxn>
+              <a:cxn ang="0">
+                <a:pos x="connsiteX2" y="connsiteY2"/>
+              </a:cxn>
+              <a:cxn ang="0">
+                <a:pos x="connsiteX3" y="connsiteY3"/>
+              </a:cxn>
+              <a:cxn ang="0">
+                <a:pos x="connsiteX4" y="connsiteY4"/>
+              </a:cxn>
+              <a:cxn ang="0">
+                <a:pos x="connsiteX5" y="connsiteY5"/>
+              </a:cxn>
+              <a:cxn ang="0">
+                <a:pos x="connsiteX6" y="connsiteY6"/>
+              </a:cxn>
+            </a:cxnLst>
+            <a:rect l="l" t="t" r="r" b="b"/>
+            <a:pathLst>
+              <a:path w="5704117" h="6096000">
+                <a:moveTo>
+                  <a:pt x="4562795" y="0"/>
+                </a:moveTo>
+                <a:lnTo>
+                  <a:pt x="4721192" y="133595"/>
+                </a:lnTo>
+                <a:cubicBezTo>
+                  <a:pt x="5067135" y="440105"/>
+                  <a:pt x="5309779" y="747048"/>
+                  <a:pt x="5467522" y="1054328"/>
+                </a:cubicBezTo>
+                <a:cubicBezTo>
+                  <a:pt x="5782917" y="1668625"/>
+                  <a:pt x="5758242" y="2283795"/>
+                  <a:pt x="5538873" y="2897564"/>
+                </a:cubicBezTo>
+                <a:cubicBezTo>
+                  <a:pt x="5319500" y="3511334"/>
+                  <a:pt x="4905433" y="4123706"/>
+                  <a:pt x="4442050" y="4732407"/>
+                </a:cubicBezTo>
+                <a:cubicBezTo>
+                  <a:pt x="3499930" y="5970384"/>
+                  <a:pt x="1925433" y="6153690"/>
+                  <a:pt x="93046" y="6082857"/>
+                </a:cubicBezTo>
+                <a:lnTo>
+                  <a:pt x="0" y="6078450"/>
+                </a:lnTo>
+              </a:path>
+            </a:pathLst>
+          </a:custGeom>
+          <a:noFill/>
+          <a:ln w="19050">
+            <a:solidFill>
+              <a:schemeClr val="accent2">
+                <a:lumMod val="60000"/>
+                <a:lumOff val="40000"/>
+              </a:schemeClr>
+            </a:solidFill>
+          </a:ln>
+        </p:spPr>
+        <p:style>
+          <a:lnRef idx="2">
+            <a:schemeClr val="accent1">
+              <a:shade val="50000"/>
+            </a:schemeClr>
+          </a:lnRef>
+          <a:fillRef idx="1">
+            <a:schemeClr val="accent1"/>
+          </a:fillRef>
+          <a:effectRef idx="0">
+            <a:schemeClr val="accent1"/>
+          </a:effectRef>
+          <a:fontRef idx="minor">
+            <a:schemeClr val="lt1"/>
+          </a:fontRef>
+        </p:style>
+        <p:txBody>
+          <a:bodyPr wrap="square" rtlCol="0" anchor="ctr">
+            <a:noAutofit/>
+          </a:bodyPr>
+          <a:lstStyle/>
+          <a:p>
+            <a:pPr algn="ctr"/>
+            <a:endParaRPr lang="en-US">
+              <a:solidFill>
+                <a:prstClr val="white"/>
+              </a:solidFill>
+              <a:latin typeface="Avenir Next LT Pro Light"/>
+            </a:endParaRPr>
+          </a:p>
+        </p:txBody>
+      </p:sp>
+      <p:sp>
+        <p:nvSpPr>
+          <p:cNvPr id="2" name="Title 1">
+            <a:extLst>
+              <a:ext uri="{FF2B5EF4-FFF2-40B4-BE49-F238E27FC236}">
+                <a16:creationId xmlns:a16="http://schemas.microsoft.com/office/drawing/2014/main" id="{974CEC7D-0FBE-2742-8701-3BB6A53C7892}"/>
+              </a:ext>
+            </a:extLst>
+          </p:cNvPr>
+          <p:cNvSpPr>
+            <a:spLocks noGrp="1"/>
+          </p:cNvSpPr>
+          <p:nvPr>
+            <p:ph type="title"/>
+          </p:nvPr>
+        </p:nvSpPr>
+        <p:spPr>
+          <a:xfrm>
+            <a:off x="762000" y="762000"/>
+            <a:ext cx="5334000" cy="1524000"/>
+          </a:xfrm>
+        </p:spPr>
+        <p:txBody>
+          <a:bodyPr>
+            <a:normAutofit/>
+          </a:bodyPr>
+          <a:lstStyle/>
+          <a:p>
+            <a:r>
+              <a:rPr lang="en-US" sz="3200"/>
+              <a:t>Functions</a:t>
+            </a:r>
+          </a:p>
+        </p:txBody>
+      </p:sp>
+      <p:pic>
+        <p:nvPicPr>
+          <p:cNvPr id="5" name="Content Placeholder 4" descr="Text&#10;&#10;Description automatically generated">
+            <a:extLst>
+              <a:ext uri="{FF2B5EF4-FFF2-40B4-BE49-F238E27FC236}">
+                <a16:creationId xmlns:a16="http://schemas.microsoft.com/office/drawing/2014/main" id="{8128354B-3EA7-F746-BF89-71AE3E3A08E0}"/>
+              </a:ext>
+            </a:extLst>
+          </p:cNvPr>
+          <p:cNvPicPr>
+            <a:picLocks noChangeAspect="1"/>
+          </p:cNvPicPr>
+          <p:nvPr/>
+        </p:nvPicPr>
+        <p:blipFill>
+          <a:blip r:embed="rId2"/>
+          <a:stretch>
+            <a:fillRect/>
+          </a:stretch>
+        </p:blipFill>
+        <p:spPr>
+          <a:xfrm>
+            <a:off x="2888229" y="-67744"/>
+            <a:ext cx="9303769" cy="6163744"/>
+          </a:xfrm>
+          <a:prstGeom prst="rect">
+            <a:avLst/>
+          </a:prstGeom>
+        </p:spPr>
+      </p:pic>
+    </p:spTree>
+    <p:extLst>
+      <p:ext uri="{BB962C8B-B14F-4D97-AF65-F5344CB8AC3E}">
+        <p14:creationId xmlns:p14="http://schemas.microsoft.com/office/powerpoint/2010/main" val="860866052"/>
+      </p:ext>
+    </p:extLst>
+  </p:cSld>
+  <p:clrMapOvr>
+    <a:masterClrMapping/>
+  </p:clrMapOvr>
+</p:sld>
+</file>
+
+<file path=ppt/slides/slide19.xml><?xml version="1.0" encoding="utf-8"?>
+<p:sld xmlns:a="http://schemas.openxmlformats.org/drawingml/2006/main" xmlns:r="http://schemas.openxmlformats.org/officeDocument/2006/relationships" xmlns:p="http://schemas.openxmlformats.org/presentationml/2006/main">
+  <p:cSld>
     <p:spTree>
       <p:nvGrpSpPr>
         <p:cNvPr id="1" name=""/>
@@ -11958,7 +12485,7 @@
           <p:cNvPr id="2" name="Title 1">
             <a:extLst>
               <a:ext uri="{FF2B5EF4-FFF2-40B4-BE49-F238E27FC236}">
-                <a16:creationId xmlns:a16="http://schemas.microsoft.com/office/drawing/2014/main" id="{974CEC7D-0FBE-2742-8701-3BB6A53C7892}"/>
+                <a16:creationId xmlns:a16="http://schemas.microsoft.com/office/drawing/2014/main" id="{B83AED91-200C-B943-8C3D-624CD878A867}"/>
               </a:ext>
             </a:extLst>
           </p:cNvPr>
@@ -11974,7 +12501,21 @@
           <a:bodyPr/>
           <a:lstStyle/>
           <a:p>
-            <a:endParaRPr lang="en-US"/>
+            <a:r>
+              <a:rPr lang="en-US" dirty="0">
+                <a:latin typeface="IBM Plex Mono Light" panose="020B0409050203000203" pitchFamily="49" charset="77"/>
+              </a:rPr>
+              <a:t>Control Flow Statement </a:t>
+            </a:r>
+            <a:r>
+              <a:rPr lang="en-US" sz="1200" dirty="0">
+                <a:latin typeface="IBM Plex Mono Light" panose="020B0409050203000203" pitchFamily="49" charset="77"/>
+              </a:rPr>
+              <a:t>– IF.. ELSE IF.. ELSE..</a:t>
+            </a:r>
+            <a:endParaRPr lang="en-US" dirty="0">
+              <a:latin typeface="IBM Plex Mono Light" panose="020B0409050203000203" pitchFamily="49" charset="77"/>
+            </a:endParaRPr>
           </a:p>
         </p:txBody>
       </p:sp>
@@ -11983,7 +12524,7 @@
           <p:cNvPr id="3" name="Content Placeholder 2">
             <a:extLst>
               <a:ext uri="{FF2B5EF4-FFF2-40B4-BE49-F238E27FC236}">
-                <a16:creationId xmlns:a16="http://schemas.microsoft.com/office/drawing/2014/main" id="{912FF6F6-E547-1848-81DB-56D8AD95DC8C}"/>
+                <a16:creationId xmlns:a16="http://schemas.microsoft.com/office/drawing/2014/main" id="{92055E4C-5037-C643-8CDF-EE5F5A45DE0C}"/>
               </a:ext>
             </a:extLst>
           </p:cNvPr>
@@ -11996,17 +12537,93 @@
         </p:nvSpPr>
         <p:spPr/>
         <p:txBody>
-          <a:bodyPr/>
+          <a:bodyPr>
+            <a:normAutofit fontScale="92500" lnSpcReduction="20000"/>
+          </a:bodyPr>
           <a:lstStyle/>
           <a:p>
-            <a:endParaRPr lang="en-US"/>
+            <a:pPr marL="0" indent="0">
+              <a:buNone/>
+            </a:pPr>
+            <a:r>
+              <a:rPr lang="en-US" dirty="0">
+                <a:latin typeface="IBM Plex Mono Light" panose="020B0409050203000203" pitchFamily="49" charset="77"/>
+              </a:rPr>
+              <a:t>if  &lt;cond&gt; {</a:t>
+            </a:r>
+          </a:p>
+          <a:p>
+            <a:pPr marL="0" indent="0">
+              <a:buNone/>
+            </a:pPr>
+            <a:r>
+              <a:rPr lang="en-US" dirty="0">
+                <a:latin typeface="IBM Plex Mono Light" panose="020B0409050203000203" pitchFamily="49" charset="77"/>
+              </a:rPr>
+              <a:t>	...</a:t>
+            </a:r>
+          </a:p>
+          <a:p>
+            <a:pPr marL="0" indent="0">
+              <a:buNone/>
+            </a:pPr>
+            <a:r>
+              <a:rPr lang="en-US" dirty="0">
+                <a:latin typeface="IBM Plex Mono Light" panose="020B0409050203000203" pitchFamily="49" charset="77"/>
+              </a:rPr>
+              <a:t>} else if &lt;cond&gt; {</a:t>
+            </a:r>
+          </a:p>
+          <a:p>
+            <a:pPr marL="0" indent="0">
+              <a:buNone/>
+            </a:pPr>
+            <a:r>
+              <a:rPr lang="en-US" dirty="0">
+                <a:latin typeface="IBM Plex Mono Light" panose="020B0409050203000203" pitchFamily="49" charset="77"/>
+              </a:rPr>
+              <a:t>	…</a:t>
+            </a:r>
+          </a:p>
+          <a:p>
+            <a:pPr marL="0" indent="0">
+              <a:buNone/>
+            </a:pPr>
+            <a:r>
+              <a:rPr lang="en-US" dirty="0">
+                <a:latin typeface="IBM Plex Mono Light" panose="020B0409050203000203" pitchFamily="49" charset="77"/>
+              </a:rPr>
+              <a:t>} else {</a:t>
+            </a:r>
+          </a:p>
+          <a:p>
+            <a:pPr marL="0" indent="0">
+              <a:buNone/>
+            </a:pPr>
+            <a:r>
+              <a:rPr lang="en-US" dirty="0">
+                <a:latin typeface="IBM Plex Mono Light" panose="020B0409050203000203" pitchFamily="49" charset="77"/>
+              </a:rPr>
+              <a:t>	…</a:t>
+            </a:r>
+          </a:p>
+          <a:p>
+            <a:pPr marL="0" indent="0">
+              <a:buNone/>
+            </a:pPr>
+            <a:r>
+              <a:rPr lang="en-US" dirty="0">
+                <a:latin typeface="IBM Plex Mono Light" panose="020B0409050203000203" pitchFamily="49" charset="77"/>
+              </a:rPr>
+              <a:t>}</a:t>
+            </a:r>
           </a:p>
         </p:txBody>
       </p:sp>
     </p:spTree>
     <p:extLst>
       <p:ext uri="{BB962C8B-B14F-4D97-AF65-F5344CB8AC3E}">
-        <p14:creationId xmlns:p14="http://schemas.microsoft.com/office/powerpoint/2010/main" val="860866052"/>
+        <p14:creationId xmlns:p14="http://schemas.microsoft.com/office/powerpoint/2010/main" val="2429870786"/>
       </p:ext>
     </p:extLst>
   </p:cSld>

</xml_diff>

<commit_message>
control statements - loop, while and for
</commit_message>
<xml_diff>
--- a/rust-lang.pptx
+++ b/rust-lang.pptx
@@ -4,6 +4,9 @@
   <p:sldMasterIdLst>
     <p:sldMasterId id="2147483718" r:id="rId1"/>
   </p:sldMasterIdLst>
+  <p:notesMasterIdLst>
+    <p:notesMasterId r:id="rId25"/>
+  </p:notesMasterIdLst>
   <p:sldIdLst>
     <p:sldId id="256" r:id="rId2"/>
     <p:sldId id="257" r:id="rId3"/>
@@ -24,6 +27,10 @@
     <p:sldId id="272" r:id="rId18"/>
     <p:sldId id="273" r:id="rId19"/>
     <p:sldId id="274" r:id="rId20"/>
+    <p:sldId id="275" r:id="rId21"/>
+    <p:sldId id="276" r:id="rId22"/>
+    <p:sldId id="277" r:id="rId23"/>
+    <p:sldId id="278" r:id="rId24"/>
   </p:sldIdLst>
   <p:sldSz cx="12192000" cy="6858000"/>
   <p:notesSz cx="6858000" cy="9144000"/>
@@ -123,6 +130,440 @@
     </a:lvl9pPr>
   </p:defaultTextStyle>
 </p:presentation>
+</file>
+
+<file path=ppt/notesMasters/notesMaster1.xml><?xml version="1.0" encoding="utf-8"?>
+<p:notesMaster xmlns:a="http://schemas.openxmlformats.org/drawingml/2006/main" xmlns:r="http://schemas.openxmlformats.org/officeDocument/2006/relationships" xmlns:p="http://schemas.openxmlformats.org/presentationml/2006/main">
+  <p:cSld>
+    <p:bg>
+      <p:bgRef idx="1001">
+        <a:schemeClr val="bg1"/>
+      </p:bgRef>
+    </p:bg>
+    <p:spTree>
+      <p:nvGrpSpPr>
+        <p:cNvPr id="1" name=""/>
+        <p:cNvGrpSpPr/>
+        <p:nvPr/>
+      </p:nvGrpSpPr>
+      <p:grpSpPr>
+        <a:xfrm>
+          <a:off x="0" y="0"/>
+          <a:ext cx="0" cy="0"/>
+          <a:chOff x="0" y="0"/>
+          <a:chExt cx="0" cy="0"/>
+        </a:xfrm>
+      </p:grpSpPr>
+      <p:sp>
+        <p:nvSpPr>
+          <p:cNvPr id="2" name="Header Placeholder 1"/>
+          <p:cNvSpPr>
+            <a:spLocks noGrp="1"/>
+          </p:cNvSpPr>
+          <p:nvPr>
+            <p:ph type="hdr" sz="quarter"/>
+          </p:nvPr>
+        </p:nvSpPr>
+        <p:spPr>
+          <a:xfrm>
+            <a:off x="0" y="0"/>
+            <a:ext cx="2971800" cy="458788"/>
+          </a:xfrm>
+          <a:prstGeom prst="rect">
+            <a:avLst/>
+          </a:prstGeom>
+        </p:spPr>
+        <p:txBody>
+          <a:bodyPr vert="horz" lIns="91440" tIns="45720" rIns="91440" bIns="45720" rtlCol="0"/>
+          <a:lstStyle>
+            <a:lvl1pPr algn="l">
+              <a:defRPr sz="1200"/>
+            </a:lvl1pPr>
+          </a:lstStyle>
+          <a:p>
+            <a:endParaRPr lang="en-US"/>
+          </a:p>
+        </p:txBody>
+      </p:sp>
+      <p:sp>
+        <p:nvSpPr>
+          <p:cNvPr id="3" name="Date Placeholder 2"/>
+          <p:cNvSpPr>
+            <a:spLocks noGrp="1"/>
+          </p:cNvSpPr>
+          <p:nvPr>
+            <p:ph type="dt" idx="1"/>
+          </p:nvPr>
+        </p:nvSpPr>
+        <p:spPr>
+          <a:xfrm>
+            <a:off x="3884613" y="0"/>
+            <a:ext cx="2971800" cy="458788"/>
+          </a:xfrm>
+          <a:prstGeom prst="rect">
+            <a:avLst/>
+          </a:prstGeom>
+        </p:spPr>
+        <p:txBody>
+          <a:bodyPr vert="horz" lIns="91440" tIns="45720" rIns="91440" bIns="45720" rtlCol="0"/>
+          <a:lstStyle>
+            <a:lvl1pPr algn="r">
+              <a:defRPr sz="1200"/>
+            </a:lvl1pPr>
+          </a:lstStyle>
+          <a:p>
+            <a:fld id="{4F650273-869E-4F4B-90CE-C585F975C64C}" type="datetimeFigureOut">
+              <a:rPr lang="en-US" smtClean="0"/>
+              <a:t>4/28/21</a:t>
+            </a:fld>
+            <a:endParaRPr lang="en-US"/>
+          </a:p>
+        </p:txBody>
+      </p:sp>
+      <p:sp>
+        <p:nvSpPr>
+          <p:cNvPr id="4" name="Slide Image Placeholder 3"/>
+          <p:cNvSpPr>
+            <a:spLocks noGrp="1" noRot="1" noChangeAspect="1"/>
+          </p:cNvSpPr>
+          <p:nvPr>
+            <p:ph type="sldImg" idx="2"/>
+          </p:nvPr>
+        </p:nvSpPr>
+        <p:spPr>
+          <a:xfrm>
+            <a:off x="685800" y="1143000"/>
+            <a:ext cx="5486400" cy="3086100"/>
+          </a:xfrm>
+          <a:prstGeom prst="rect">
+            <a:avLst/>
+          </a:prstGeom>
+          <a:noFill/>
+          <a:ln w="12700">
+            <a:solidFill>
+              <a:prstClr val="black"/>
+            </a:solidFill>
+          </a:ln>
+        </p:spPr>
+        <p:txBody>
+          <a:bodyPr vert="horz" lIns="91440" tIns="45720" rIns="91440" bIns="45720" rtlCol="0" anchor="ctr"/>
+          <a:lstStyle/>
+          <a:p>
+            <a:endParaRPr lang="en-US"/>
+          </a:p>
+        </p:txBody>
+      </p:sp>
+      <p:sp>
+        <p:nvSpPr>
+          <p:cNvPr id="5" name="Notes Placeholder 4"/>
+          <p:cNvSpPr>
+            <a:spLocks noGrp="1"/>
+          </p:cNvSpPr>
+          <p:nvPr>
+            <p:ph type="body" sz="quarter" idx="3"/>
+          </p:nvPr>
+        </p:nvSpPr>
+        <p:spPr>
+          <a:xfrm>
+            <a:off x="685800" y="4400550"/>
+            <a:ext cx="5486400" cy="3600450"/>
+          </a:xfrm>
+          <a:prstGeom prst="rect">
+            <a:avLst/>
+          </a:prstGeom>
+        </p:spPr>
+        <p:txBody>
+          <a:bodyPr vert="horz" lIns="91440" tIns="45720" rIns="91440" bIns="45720" rtlCol="0"/>
+          <a:lstStyle/>
+          <a:p>
+            <a:pPr lvl="0"/>
+            <a:r>
+              <a:rPr lang="en-GB"/>
+              <a:t>Click to edit Master text styles</a:t>
+            </a:r>
+          </a:p>
+          <a:p>
+            <a:pPr lvl="1"/>
+            <a:r>
+              <a:rPr lang="en-GB"/>
+              <a:t>Second level</a:t>
+            </a:r>
+          </a:p>
+          <a:p>
+            <a:pPr lvl="2"/>
+            <a:r>
+              <a:rPr lang="en-GB"/>
+              <a:t>Third level</a:t>
+            </a:r>
+          </a:p>
+          <a:p>
+            <a:pPr lvl="3"/>
+            <a:r>
+              <a:rPr lang="en-GB"/>
+              <a:t>Fourth level</a:t>
+            </a:r>
+          </a:p>
+          <a:p>
+            <a:pPr lvl="4"/>
+            <a:r>
+              <a:rPr lang="en-GB"/>
+              <a:t>Fifth level</a:t>
+            </a:r>
+            <a:endParaRPr lang="en-US"/>
+          </a:p>
+        </p:txBody>
+      </p:sp>
+      <p:sp>
+        <p:nvSpPr>
+          <p:cNvPr id="6" name="Footer Placeholder 5"/>
+          <p:cNvSpPr>
+            <a:spLocks noGrp="1"/>
+          </p:cNvSpPr>
+          <p:nvPr>
+            <p:ph type="ftr" sz="quarter" idx="4"/>
+          </p:nvPr>
+        </p:nvSpPr>
+        <p:spPr>
+          <a:xfrm>
+            <a:off x="0" y="8685213"/>
+            <a:ext cx="2971800" cy="458787"/>
+          </a:xfrm>
+          <a:prstGeom prst="rect">
+            <a:avLst/>
+          </a:prstGeom>
+        </p:spPr>
+        <p:txBody>
+          <a:bodyPr vert="horz" lIns="91440" tIns="45720" rIns="91440" bIns="45720" rtlCol="0" anchor="b"/>
+          <a:lstStyle>
+            <a:lvl1pPr algn="l">
+              <a:defRPr sz="1200"/>
+            </a:lvl1pPr>
+          </a:lstStyle>
+          <a:p>
+            <a:endParaRPr lang="en-US"/>
+          </a:p>
+        </p:txBody>
+      </p:sp>
+      <p:sp>
+        <p:nvSpPr>
+          <p:cNvPr id="7" name="Slide Number Placeholder 6"/>
+          <p:cNvSpPr>
+            <a:spLocks noGrp="1"/>
+          </p:cNvSpPr>
+          <p:nvPr>
+            <p:ph type="sldNum" sz="quarter" idx="5"/>
+          </p:nvPr>
+        </p:nvSpPr>
+        <p:spPr>
+          <a:xfrm>
+            <a:off x="3884613" y="8685213"/>
+            <a:ext cx="2971800" cy="458787"/>
+          </a:xfrm>
+          <a:prstGeom prst="rect">
+            <a:avLst/>
+          </a:prstGeom>
+        </p:spPr>
+        <p:txBody>
+          <a:bodyPr vert="horz" lIns="91440" tIns="45720" rIns="91440" bIns="45720" rtlCol="0" anchor="b"/>
+          <a:lstStyle>
+            <a:lvl1pPr algn="r">
+              <a:defRPr sz="1200"/>
+            </a:lvl1pPr>
+          </a:lstStyle>
+          <a:p>
+            <a:fld id="{A4C54EEE-C41A-974B-AD49-51AE4A19F599}" type="slidenum">
+              <a:rPr lang="en-US" smtClean="0"/>
+              <a:t>‹#›</a:t>
+            </a:fld>
+            <a:endParaRPr lang="en-US"/>
+          </a:p>
+        </p:txBody>
+      </p:sp>
+    </p:spTree>
+    <p:extLst>
+      <p:ext uri="{BB962C8B-B14F-4D97-AF65-F5344CB8AC3E}">
+        <p14:creationId xmlns:p14="http://schemas.microsoft.com/office/powerpoint/2010/main" val="812350307"/>
+      </p:ext>
+    </p:extLst>
+  </p:cSld>
+  <p:clrMap bg1="lt1" tx1="dk1" bg2="lt2" tx2="dk2" accent1="accent1" accent2="accent2" accent3="accent3" accent4="accent4" accent5="accent5" accent6="accent6" hlink="hlink" folHlink="folHlink"/>
+  <p:notesStyle>
+    <a:lvl1pPr marL="0" algn="l" defTabSz="914400" rtl="0" eaLnBrk="1" latinLnBrk="0" hangingPunct="1">
+      <a:defRPr sz="1200" kern="1200">
+        <a:solidFill>
+          <a:schemeClr val="tx1"/>
+        </a:solidFill>
+        <a:latin typeface="+mn-lt"/>
+        <a:ea typeface="+mn-ea"/>
+        <a:cs typeface="+mn-cs"/>
+      </a:defRPr>
+    </a:lvl1pPr>
+    <a:lvl2pPr marL="457200" algn="l" defTabSz="914400" rtl="0" eaLnBrk="1" latinLnBrk="0" hangingPunct="1">
+      <a:defRPr sz="1200" kern="1200">
+        <a:solidFill>
+          <a:schemeClr val="tx1"/>
+        </a:solidFill>
+        <a:latin typeface="+mn-lt"/>
+        <a:ea typeface="+mn-ea"/>
+        <a:cs typeface="+mn-cs"/>
+      </a:defRPr>
+    </a:lvl2pPr>
+    <a:lvl3pPr marL="914400" algn="l" defTabSz="914400" rtl="0" eaLnBrk="1" latinLnBrk="0" hangingPunct="1">
+      <a:defRPr sz="1200" kern="1200">
+        <a:solidFill>
+          <a:schemeClr val="tx1"/>
+        </a:solidFill>
+        <a:latin typeface="+mn-lt"/>
+        <a:ea typeface="+mn-ea"/>
+        <a:cs typeface="+mn-cs"/>
+      </a:defRPr>
+    </a:lvl3pPr>
+    <a:lvl4pPr marL="1371600" algn="l" defTabSz="914400" rtl="0" eaLnBrk="1" latinLnBrk="0" hangingPunct="1">
+      <a:defRPr sz="1200" kern="1200">
+        <a:solidFill>
+          <a:schemeClr val="tx1"/>
+        </a:solidFill>
+        <a:latin typeface="+mn-lt"/>
+        <a:ea typeface="+mn-ea"/>
+        <a:cs typeface="+mn-cs"/>
+      </a:defRPr>
+    </a:lvl4pPr>
+    <a:lvl5pPr marL="1828800" algn="l" defTabSz="914400" rtl="0" eaLnBrk="1" latinLnBrk="0" hangingPunct="1">
+      <a:defRPr sz="1200" kern="1200">
+        <a:solidFill>
+          <a:schemeClr val="tx1"/>
+        </a:solidFill>
+        <a:latin typeface="+mn-lt"/>
+        <a:ea typeface="+mn-ea"/>
+        <a:cs typeface="+mn-cs"/>
+      </a:defRPr>
+    </a:lvl5pPr>
+    <a:lvl6pPr marL="2286000" algn="l" defTabSz="914400" rtl="0" eaLnBrk="1" latinLnBrk="0" hangingPunct="1">
+      <a:defRPr sz="1200" kern="1200">
+        <a:solidFill>
+          <a:schemeClr val="tx1"/>
+        </a:solidFill>
+        <a:latin typeface="+mn-lt"/>
+        <a:ea typeface="+mn-ea"/>
+        <a:cs typeface="+mn-cs"/>
+      </a:defRPr>
+    </a:lvl6pPr>
+    <a:lvl7pPr marL="2743200" algn="l" defTabSz="914400" rtl="0" eaLnBrk="1" latinLnBrk="0" hangingPunct="1">
+      <a:defRPr sz="1200" kern="1200">
+        <a:solidFill>
+          <a:schemeClr val="tx1"/>
+        </a:solidFill>
+        <a:latin typeface="+mn-lt"/>
+        <a:ea typeface="+mn-ea"/>
+        <a:cs typeface="+mn-cs"/>
+      </a:defRPr>
+    </a:lvl7pPr>
+    <a:lvl8pPr marL="3200400" algn="l" defTabSz="914400" rtl="0" eaLnBrk="1" latinLnBrk="0" hangingPunct="1">
+      <a:defRPr sz="1200" kern="1200">
+        <a:solidFill>
+          <a:schemeClr val="tx1"/>
+        </a:solidFill>
+        <a:latin typeface="+mn-lt"/>
+        <a:ea typeface="+mn-ea"/>
+        <a:cs typeface="+mn-cs"/>
+      </a:defRPr>
+    </a:lvl8pPr>
+    <a:lvl9pPr marL="3657600" algn="l" defTabSz="914400" rtl="0" eaLnBrk="1" latinLnBrk="0" hangingPunct="1">
+      <a:defRPr sz="1200" kern="1200">
+        <a:solidFill>
+          <a:schemeClr val="tx1"/>
+        </a:solidFill>
+        <a:latin typeface="+mn-lt"/>
+        <a:ea typeface="+mn-ea"/>
+        <a:cs typeface="+mn-cs"/>
+      </a:defRPr>
+    </a:lvl9pPr>
+  </p:notesStyle>
+</p:notesMaster>
+</file>
+
+<file path=ppt/notesSlides/notesSlide1.xml><?xml version="1.0" encoding="utf-8"?>
+<p:notes xmlns:a="http://schemas.openxmlformats.org/drawingml/2006/main" xmlns:r="http://schemas.openxmlformats.org/officeDocument/2006/relationships" xmlns:p="http://schemas.openxmlformats.org/presentationml/2006/main">
+  <p:cSld>
+    <p:spTree>
+      <p:nvGrpSpPr>
+        <p:cNvPr id="1" name=""/>
+        <p:cNvGrpSpPr/>
+        <p:nvPr/>
+      </p:nvGrpSpPr>
+      <p:grpSpPr>
+        <a:xfrm>
+          <a:off x="0" y="0"/>
+          <a:ext cx="0" cy="0"/>
+          <a:chOff x="0" y="0"/>
+          <a:chExt cx="0" cy="0"/>
+        </a:xfrm>
+      </p:grpSpPr>
+      <p:sp>
+        <p:nvSpPr>
+          <p:cNvPr id="2" name="Slide Image Placeholder 1"/>
+          <p:cNvSpPr>
+            <a:spLocks noGrp="1" noRot="1" noChangeAspect="1"/>
+          </p:cNvSpPr>
+          <p:nvPr>
+            <p:ph type="sldImg"/>
+          </p:nvPr>
+        </p:nvSpPr>
+        <p:spPr/>
+      </p:sp>
+      <p:sp>
+        <p:nvSpPr>
+          <p:cNvPr id="3" name="Notes Placeholder 2"/>
+          <p:cNvSpPr>
+            <a:spLocks noGrp="1"/>
+          </p:cNvSpPr>
+          <p:nvPr>
+            <p:ph type="body" idx="1"/>
+          </p:nvPr>
+        </p:nvSpPr>
+        <p:spPr/>
+        <p:txBody>
+          <a:bodyPr/>
+          <a:lstStyle/>
+          <a:p>
+            <a:endParaRPr lang="en-US" dirty="0"/>
+          </a:p>
+        </p:txBody>
+      </p:sp>
+      <p:sp>
+        <p:nvSpPr>
+          <p:cNvPr id="4" name="Slide Number Placeholder 3"/>
+          <p:cNvSpPr>
+            <a:spLocks noGrp="1"/>
+          </p:cNvSpPr>
+          <p:nvPr>
+            <p:ph type="sldNum" sz="quarter" idx="5"/>
+          </p:nvPr>
+        </p:nvSpPr>
+        <p:spPr/>
+        <p:txBody>
+          <a:bodyPr/>
+          <a:lstStyle/>
+          <a:p>
+            <a:fld id="{A4C54EEE-C41A-974B-AD49-51AE4A19F599}" type="slidenum">
+              <a:rPr lang="en-US" smtClean="0"/>
+              <a:t>20</a:t>
+            </a:fld>
+            <a:endParaRPr lang="en-US"/>
+          </a:p>
+        </p:txBody>
+      </p:sp>
+    </p:spTree>
+    <p:extLst>
+      <p:ext uri="{BB962C8B-B14F-4D97-AF65-F5344CB8AC3E}">
+        <p14:creationId xmlns:p14="http://schemas.microsoft.com/office/powerpoint/2010/main" val="1799507206"/>
+      </p:ext>
+    </p:extLst>
+  </p:cSld>
+  <p:clrMapOvr>
+    <a:masterClrMapping/>
+  </p:clrMapOvr>
+</p:notes>
 </file>
 
 <file path=ppt/slideLayouts/slideLayout1.xml><?xml version="1.0" encoding="utf-8"?>
@@ -12822,6 +13263,1807 @@
 </p:sld>
 </file>
 
+<file path=ppt/slides/slide20.xml><?xml version="1.0" encoding="utf-8"?>
+<p:sld xmlns:a="http://schemas.openxmlformats.org/drawingml/2006/main" xmlns:r="http://schemas.openxmlformats.org/officeDocument/2006/relationships" xmlns:p="http://schemas.openxmlformats.org/presentationml/2006/main">
+  <p:cSld>
+    <p:bg>
+      <p:bgPr>
+        <a:solidFill>
+          <a:schemeClr val="bg2"/>
+        </a:solidFill>
+        <a:effectLst/>
+      </p:bgPr>
+    </p:bg>
+    <p:spTree>
+      <p:nvGrpSpPr>
+        <p:cNvPr id="1" name=""/>
+        <p:cNvGrpSpPr/>
+        <p:nvPr/>
+      </p:nvGrpSpPr>
+      <p:grpSpPr>
+        <a:xfrm>
+          <a:off x="0" y="0"/>
+          <a:ext cx="0" cy="0"/>
+          <a:chOff x="0" y="0"/>
+          <a:chExt cx="0" cy="0"/>
+        </a:xfrm>
+      </p:grpSpPr>
+      <p:sp>
+        <p:nvSpPr>
+          <p:cNvPr id="29" name="Freeform: Shape 28">
+            <a:extLst>
+              <a:ext uri="{FF2B5EF4-FFF2-40B4-BE49-F238E27FC236}">
+                <a16:creationId xmlns:a16="http://schemas.microsoft.com/office/drawing/2014/main" id="{A6EF5A53-0A64-4CA5-B9C7-1CB97CB5CF1C}"/>
+              </a:ext>
+              <a:ext uri="{C183D7F6-B498-43B3-948B-1728B52AA6E4}">
+                <adec:decorative xmlns:adec="http://schemas.microsoft.com/office/drawing/2017/decorative" val="1"/>
+              </a:ext>
+            </a:extLst>
+          </p:cNvPr>
+          <p:cNvSpPr>
+            <a:spLocks noGrp="1" noRot="1" noChangeAspect="1" noMove="1" noResize="1" noEditPoints="1" noAdjustHandles="1" noChangeArrowheads="1" noChangeShapeType="1" noTextEdit="1"/>
+          </p:cNvSpPr>
+          <p:nvPr>
+            <p:extLst>
+              <p:ext uri="{386F3935-93C4-4BCD-93E2-E3B085C9AB24}">
+                <p16:designElem xmlns:p16="http://schemas.microsoft.com/office/powerpoint/2015/main" val="1"/>
+              </p:ext>
+            </p:extLst>
+          </p:nvPr>
+        </p:nvSpPr>
+        <p:spPr>
+          <a:xfrm>
+            <a:off x="8157843" y="6244836"/>
+            <a:ext cx="4034156" cy="613164"/>
+          </a:xfrm>
+          <a:custGeom>
+            <a:avLst/>
+            <a:gdLst>
+              <a:gd name="connsiteX0" fmla="*/ 1479137 w 4034156"/>
+              <a:gd name="connsiteY0" fmla="*/ 230 h 613164"/>
+              <a:gd name="connsiteX1" fmla="*/ 3482844 w 4034156"/>
+              <a:gd name="connsiteY1" fmla="*/ 298555 h 613164"/>
+              <a:gd name="connsiteX2" fmla="*/ 3831590 w 4034156"/>
+              <a:gd name="connsiteY2" fmla="*/ 425010 h 613164"/>
+              <a:gd name="connsiteX3" fmla="*/ 4034156 w 4034156"/>
+              <a:gd name="connsiteY3" fmla="*/ 494088 h 613164"/>
+              <a:gd name="connsiteX4" fmla="*/ 4034156 w 4034156"/>
+              <a:gd name="connsiteY4" fmla="*/ 613164 h 613164"/>
+              <a:gd name="connsiteX5" fmla="*/ 0 w 4034156"/>
+              <a:gd name="connsiteY5" fmla="*/ 613164 h 613164"/>
+              <a:gd name="connsiteX6" fmla="*/ 54792 w 4034156"/>
+              <a:gd name="connsiteY6" fmla="*/ 512415 h 613164"/>
+              <a:gd name="connsiteX7" fmla="*/ 168327 w 4034156"/>
+              <a:gd name="connsiteY7" fmla="*/ 366637 h 613164"/>
+              <a:gd name="connsiteX8" fmla="*/ 1192562 w 4034156"/>
+              <a:gd name="connsiteY8" fmla="*/ 1522 h 613164"/>
+              <a:gd name="connsiteX9" fmla="*/ 1479137 w 4034156"/>
+              <a:gd name="connsiteY9" fmla="*/ 230 h 613164"/>
+            </a:gdLst>
+            <a:ahLst/>
+            <a:cxnLst>
+              <a:cxn ang="0">
+                <a:pos x="connsiteX0" y="connsiteY0"/>
+              </a:cxn>
+              <a:cxn ang="0">
+                <a:pos x="connsiteX1" y="connsiteY1"/>
+              </a:cxn>
+              <a:cxn ang="0">
+                <a:pos x="connsiteX2" y="connsiteY2"/>
+              </a:cxn>
+              <a:cxn ang="0">
+                <a:pos x="connsiteX3" y="connsiteY3"/>
+              </a:cxn>
+              <a:cxn ang="0">
+                <a:pos x="connsiteX4" y="connsiteY4"/>
+              </a:cxn>
+              <a:cxn ang="0">
+                <a:pos x="connsiteX5" y="connsiteY5"/>
+              </a:cxn>
+              <a:cxn ang="0">
+                <a:pos x="connsiteX6" y="connsiteY6"/>
+              </a:cxn>
+              <a:cxn ang="0">
+                <a:pos x="connsiteX7" y="connsiteY7"/>
+              </a:cxn>
+              <a:cxn ang="0">
+                <a:pos x="connsiteX8" y="connsiteY8"/>
+              </a:cxn>
+              <a:cxn ang="0">
+                <a:pos x="connsiteX9" y="connsiteY9"/>
+              </a:cxn>
+            </a:cxnLst>
+            <a:rect l="l" t="t" r="r" b="b"/>
+            <a:pathLst>
+              <a:path w="4034156" h="613164">
+                <a:moveTo>
+                  <a:pt x="1479137" y="230"/>
+                </a:moveTo>
+                <a:cubicBezTo>
+                  <a:pt x="2152575" y="4287"/>
+                  <a:pt x="2854487" y="63583"/>
+                  <a:pt x="3482844" y="298555"/>
+                </a:cubicBezTo>
+                <a:cubicBezTo>
+                  <a:pt x="3599338" y="342114"/>
+                  <a:pt x="3715540" y="384216"/>
+                  <a:pt x="3831590" y="425010"/>
+                </a:cubicBezTo>
+                <a:lnTo>
+                  <a:pt x="4034156" y="494088"/>
+                </a:lnTo>
+                <a:lnTo>
+                  <a:pt x="4034156" y="613164"/>
+                </a:lnTo>
+                <a:lnTo>
+                  <a:pt x="0" y="613164"/>
+                </a:lnTo>
+                <a:lnTo>
+                  <a:pt x="54792" y="512415"/>
+                </a:lnTo>
+                <a:cubicBezTo>
+                  <a:pt x="88888" y="459433"/>
+                  <a:pt x="126502" y="410480"/>
+                  <a:pt x="168327" y="366637"/>
+                </a:cubicBezTo>
+                <a:cubicBezTo>
+                  <a:pt x="428292" y="94062"/>
+                  <a:pt x="821899" y="6565"/>
+                  <a:pt x="1192562" y="1522"/>
+                </a:cubicBezTo>
+                <a:cubicBezTo>
+                  <a:pt x="1287308" y="198"/>
+                  <a:pt x="1382932" y="-349"/>
+                  <a:pt x="1479137" y="230"/>
+                </a:cubicBezTo>
+                <a:close/>
+              </a:path>
+            </a:pathLst>
+          </a:custGeom>
+          <a:solidFill>
+            <a:schemeClr val="accent6"/>
+          </a:solidFill>
+          <a:ln>
+            <a:noFill/>
+          </a:ln>
+        </p:spPr>
+        <p:style>
+          <a:lnRef idx="2">
+            <a:schemeClr val="accent1">
+              <a:shade val="50000"/>
+            </a:schemeClr>
+          </a:lnRef>
+          <a:fillRef idx="1">
+            <a:schemeClr val="accent1"/>
+          </a:fillRef>
+          <a:effectRef idx="0">
+            <a:schemeClr val="accent1"/>
+          </a:effectRef>
+          <a:fontRef idx="minor">
+            <a:schemeClr val="lt1"/>
+          </a:fontRef>
+        </p:style>
+        <p:txBody>
+          <a:bodyPr wrap="square" rtlCol="0" anchor="ctr">
+            <a:noAutofit/>
+          </a:bodyPr>
+          <a:lstStyle/>
+          <a:p>
+            <a:pPr marL="0" marR="0" lvl="0" indent="0" algn="ctr" defTabSz="914400" rtl="0" eaLnBrk="1" fontAlgn="auto" latinLnBrk="0" hangingPunct="1">
+              <a:lnSpc>
+                <a:spcPct val="100000"/>
+              </a:lnSpc>
+              <a:spcBef>
+                <a:spcPts val="0"/>
+              </a:spcBef>
+              <a:spcAft>
+                <a:spcPts val="0"/>
+              </a:spcAft>
+              <a:buClrTx/>
+              <a:buSzTx/>
+              <a:buFontTx/>
+              <a:buNone/>
+              <a:tabLst/>
+              <a:defRPr/>
+            </a:pPr>
+            <a:endParaRPr kumimoji="0" lang="en-US" sz="1500" b="0" i="0" u="none" strike="noStrike" kern="1200" cap="none" spc="0" normalizeH="0" baseline="0" noProof="0">
+              <a:ln>
+                <a:noFill/>
+              </a:ln>
+              <a:solidFill>
+                <a:prstClr val="white"/>
+              </a:solidFill>
+              <a:effectLst/>
+              <a:uLnTx/>
+              <a:uFillTx/>
+              <a:latin typeface="Avenir Next LT Pro" panose="020B0504020202020204" pitchFamily="34" charset="0"/>
+              <a:ea typeface="+mn-ea"/>
+              <a:cs typeface="+mn-cs"/>
+            </a:endParaRPr>
+          </a:p>
+        </p:txBody>
+      </p:sp>
+      <p:sp>
+        <p:nvSpPr>
+          <p:cNvPr id="31" name="Freeform: Shape 30">
+            <a:extLst>
+              <a:ext uri="{FF2B5EF4-FFF2-40B4-BE49-F238E27FC236}">
+                <a16:creationId xmlns:a16="http://schemas.microsoft.com/office/drawing/2014/main" id="{34ABFBEA-4EB0-4D02-A2C0-1733CD3D6F12}"/>
+              </a:ext>
+              <a:ext uri="{C183D7F6-B498-43B3-948B-1728B52AA6E4}">
+                <adec:decorative xmlns:adec="http://schemas.microsoft.com/office/drawing/2017/decorative" val="1"/>
+              </a:ext>
+            </a:extLst>
+          </p:cNvPr>
+          <p:cNvSpPr>
+            <a:spLocks noGrp="1" noRot="1" noChangeAspect="1" noMove="1" noResize="1" noEditPoints="1" noAdjustHandles="1" noChangeArrowheads="1" noChangeShapeType="1" noTextEdit="1"/>
+          </p:cNvSpPr>
+          <p:nvPr>
+            <p:extLst>
+              <p:ext uri="{386F3935-93C4-4BCD-93E2-E3B085C9AB24}">
+                <p16:designElem xmlns:p16="http://schemas.microsoft.com/office/powerpoint/2015/main" val="1"/>
+              </p:ext>
+            </p:extLst>
+          </p:nvPr>
+        </p:nvSpPr>
+        <p:spPr>
+          <a:xfrm>
+            <a:off x="1" y="688126"/>
+            <a:ext cx="448491" cy="1634252"/>
+          </a:xfrm>
+          <a:custGeom>
+            <a:avLst/>
+            <a:gdLst>
+              <a:gd name="connsiteX0" fmla="*/ 0 w 448491"/>
+              <a:gd name="connsiteY0" fmla="*/ 0 h 1634252"/>
+              <a:gd name="connsiteX1" fmla="*/ 12983 w 448491"/>
+              <a:gd name="connsiteY1" fmla="*/ 10508 h 1634252"/>
+              <a:gd name="connsiteX2" fmla="*/ 441611 w 448491"/>
+              <a:gd name="connsiteY2" fmla="*/ 863751 h 1634252"/>
+              <a:gd name="connsiteX3" fmla="*/ 251011 w 448491"/>
+              <a:gd name="connsiteY3" fmla="*/ 1302895 h 1634252"/>
+              <a:gd name="connsiteX4" fmla="*/ 74605 w 448491"/>
+              <a:gd name="connsiteY4" fmla="*/ 1543249 h 1634252"/>
+              <a:gd name="connsiteX5" fmla="*/ 0 w 448491"/>
+              <a:gd name="connsiteY5" fmla="*/ 1634252 h 1634252"/>
+            </a:gdLst>
+            <a:ahLst/>
+            <a:cxnLst>
+              <a:cxn ang="0">
+                <a:pos x="connsiteX0" y="connsiteY0"/>
+              </a:cxn>
+              <a:cxn ang="0">
+                <a:pos x="connsiteX1" y="connsiteY1"/>
+              </a:cxn>
+              <a:cxn ang="0">
+                <a:pos x="connsiteX2" y="connsiteY2"/>
+              </a:cxn>
+              <a:cxn ang="0">
+                <a:pos x="connsiteX3" y="connsiteY3"/>
+              </a:cxn>
+              <a:cxn ang="0">
+                <a:pos x="connsiteX4" y="connsiteY4"/>
+              </a:cxn>
+              <a:cxn ang="0">
+                <a:pos x="connsiteX5" y="connsiteY5"/>
+              </a:cxn>
+            </a:cxnLst>
+            <a:rect l="l" t="t" r="r" b="b"/>
+            <a:pathLst>
+              <a:path w="448491" h="1634252">
+                <a:moveTo>
+                  <a:pt x="0" y="0"/>
+                </a:moveTo>
+                <a:lnTo>
+                  <a:pt x="12983" y="10508"/>
+                </a:lnTo>
+                <a:cubicBezTo>
+                  <a:pt x="278410" y="241022"/>
+                  <a:pt x="489787" y="530267"/>
+                  <a:pt x="441611" y="863751"/>
+                </a:cubicBezTo>
+                <a:cubicBezTo>
+                  <a:pt x="418542" y="1022632"/>
+                  <a:pt x="337007" y="1166302"/>
+                  <a:pt x="251011" y="1302895"/>
+                </a:cubicBezTo>
+                <a:cubicBezTo>
+                  <a:pt x="215138" y="1359902"/>
+                  <a:pt x="154723" y="1442480"/>
+                  <a:pt x="74605" y="1543249"/>
+                </a:cubicBezTo>
+                <a:lnTo>
+                  <a:pt x="0" y="1634252"/>
+                </a:lnTo>
+                <a:close/>
+              </a:path>
+            </a:pathLst>
+          </a:custGeom>
+          <a:solidFill>
+            <a:schemeClr val="accent1"/>
+          </a:solidFill>
+          <a:ln>
+            <a:noFill/>
+          </a:ln>
+        </p:spPr>
+        <p:style>
+          <a:lnRef idx="2">
+            <a:schemeClr val="accent1">
+              <a:shade val="50000"/>
+            </a:schemeClr>
+          </a:lnRef>
+          <a:fillRef idx="1">
+            <a:schemeClr val="accent1"/>
+          </a:fillRef>
+          <a:effectRef idx="0">
+            <a:schemeClr val="accent1"/>
+          </a:effectRef>
+          <a:fontRef idx="minor">
+            <a:schemeClr val="lt1"/>
+          </a:fontRef>
+        </p:style>
+        <p:txBody>
+          <a:bodyPr wrap="square" rtlCol="0" anchor="ctr">
+            <a:noAutofit/>
+          </a:bodyPr>
+          <a:lstStyle/>
+          <a:p>
+            <a:pPr algn="ctr"/>
+            <a:endParaRPr lang="en-US" sz="900">
+              <a:solidFill>
+                <a:prstClr val="white"/>
+              </a:solidFill>
+              <a:latin typeface="Avenir Next LT Pro" panose="020B0504020202020204" pitchFamily="34" charset="0"/>
+            </a:endParaRPr>
+          </a:p>
+        </p:txBody>
+      </p:sp>
+      <p:sp>
+        <p:nvSpPr>
+          <p:cNvPr id="33" name="Freeform: Shape 32">
+            <a:extLst>
+              <a:ext uri="{FF2B5EF4-FFF2-40B4-BE49-F238E27FC236}">
+                <a16:creationId xmlns:a16="http://schemas.microsoft.com/office/drawing/2014/main" id="{19E083F6-57F4-487B-A766-EA0462B1EED8}"/>
+              </a:ext>
+              <a:ext uri="{C183D7F6-B498-43B3-948B-1728B52AA6E4}">
+                <adec:decorative xmlns:adec="http://schemas.microsoft.com/office/drawing/2017/decorative" val="1"/>
+              </a:ext>
+            </a:extLst>
+          </p:cNvPr>
+          <p:cNvSpPr>
+            <a:spLocks noGrp="1" noRot="1" noChangeAspect="1" noMove="1" noResize="1" noEditPoints="1" noAdjustHandles="1" noChangeArrowheads="1" noChangeShapeType="1" noTextEdit="1"/>
+          </p:cNvSpPr>
+          <p:nvPr>
+            <p:extLst>
+              <p:ext uri="{386F3935-93C4-4BCD-93E2-E3B085C9AB24}">
+                <p16:designElem xmlns:p16="http://schemas.microsoft.com/office/powerpoint/2015/main" val="1"/>
+              </p:ext>
+            </p:extLst>
+          </p:nvPr>
+        </p:nvSpPr>
+        <p:spPr>
+          <a:xfrm>
+            <a:off x="7309459" y="6144069"/>
+            <a:ext cx="4418271" cy="718159"/>
+          </a:xfrm>
+          <a:custGeom>
+            <a:avLst/>
+            <a:gdLst>
+              <a:gd name="connsiteX0" fmla="*/ 1421452 w 4590626"/>
+              <a:gd name="connsiteY0" fmla="*/ 0 h 713930"/>
+              <a:gd name="connsiteX1" fmla="*/ 3247781 w 4590626"/>
+              <a:gd name="connsiteY1" fmla="*/ 271915 h 713930"/>
+              <a:gd name="connsiteX2" fmla="*/ 4517331 w 4590626"/>
+              <a:gd name="connsiteY2" fmla="*/ 693394 h 713930"/>
+              <a:gd name="connsiteX3" fmla="*/ 4590626 w 4590626"/>
+              <a:gd name="connsiteY3" fmla="*/ 713930 h 713930"/>
+              <a:gd name="connsiteX4" fmla="*/ 0 w 4590626"/>
+              <a:gd name="connsiteY4" fmla="*/ 713930 h 713930"/>
+              <a:gd name="connsiteX5" fmla="*/ 2854 w 4590626"/>
+              <a:gd name="connsiteY5" fmla="*/ 705624 h 713930"/>
+              <a:gd name="connsiteX6" fmla="*/ 226680 w 4590626"/>
+              <a:gd name="connsiteY6" fmla="*/ 333970 h 713930"/>
+              <a:gd name="connsiteX7" fmla="*/ 1160245 w 4590626"/>
+              <a:gd name="connsiteY7" fmla="*/ 1178 h 713930"/>
+              <a:gd name="connsiteX8" fmla="*/ 1421452 w 4590626"/>
+              <a:gd name="connsiteY8" fmla="*/ 0 h 713930"/>
+              <a:gd name="connsiteX0" fmla="*/ 1421452 w 4517331"/>
+              <a:gd name="connsiteY0" fmla="*/ 0 h 713930"/>
+              <a:gd name="connsiteX1" fmla="*/ 3247781 w 4517331"/>
+              <a:gd name="connsiteY1" fmla="*/ 271915 h 713930"/>
+              <a:gd name="connsiteX2" fmla="*/ 4517331 w 4517331"/>
+              <a:gd name="connsiteY2" fmla="*/ 693394 h 713930"/>
+              <a:gd name="connsiteX3" fmla="*/ 0 w 4517331"/>
+              <a:gd name="connsiteY3" fmla="*/ 713930 h 713930"/>
+              <a:gd name="connsiteX4" fmla="*/ 2854 w 4517331"/>
+              <a:gd name="connsiteY4" fmla="*/ 705624 h 713930"/>
+              <a:gd name="connsiteX5" fmla="*/ 226680 w 4517331"/>
+              <a:gd name="connsiteY5" fmla="*/ 333970 h 713930"/>
+              <a:gd name="connsiteX6" fmla="*/ 1160245 w 4517331"/>
+              <a:gd name="connsiteY6" fmla="*/ 1178 h 713930"/>
+              <a:gd name="connsiteX7" fmla="*/ 1421452 w 4517331"/>
+              <a:gd name="connsiteY7" fmla="*/ 0 h 713930"/>
+              <a:gd name="connsiteX0" fmla="*/ 0 w 4608771"/>
+              <a:gd name="connsiteY0" fmla="*/ 713930 h 784834"/>
+              <a:gd name="connsiteX1" fmla="*/ 2854 w 4608771"/>
+              <a:gd name="connsiteY1" fmla="*/ 705624 h 784834"/>
+              <a:gd name="connsiteX2" fmla="*/ 226680 w 4608771"/>
+              <a:gd name="connsiteY2" fmla="*/ 333970 h 784834"/>
+              <a:gd name="connsiteX3" fmla="*/ 1160245 w 4608771"/>
+              <a:gd name="connsiteY3" fmla="*/ 1178 h 784834"/>
+              <a:gd name="connsiteX4" fmla="*/ 1421452 w 4608771"/>
+              <a:gd name="connsiteY4" fmla="*/ 0 h 784834"/>
+              <a:gd name="connsiteX5" fmla="*/ 3247781 w 4608771"/>
+              <a:gd name="connsiteY5" fmla="*/ 271915 h 784834"/>
+              <a:gd name="connsiteX6" fmla="*/ 4608771 w 4608771"/>
+              <a:gd name="connsiteY6" fmla="*/ 784834 h 784834"/>
+              <a:gd name="connsiteX0" fmla="*/ 0 w 4418271"/>
+              <a:gd name="connsiteY0" fmla="*/ 713930 h 718159"/>
+              <a:gd name="connsiteX1" fmla="*/ 2854 w 4418271"/>
+              <a:gd name="connsiteY1" fmla="*/ 705624 h 718159"/>
+              <a:gd name="connsiteX2" fmla="*/ 226680 w 4418271"/>
+              <a:gd name="connsiteY2" fmla="*/ 333970 h 718159"/>
+              <a:gd name="connsiteX3" fmla="*/ 1160245 w 4418271"/>
+              <a:gd name="connsiteY3" fmla="*/ 1178 h 718159"/>
+              <a:gd name="connsiteX4" fmla="*/ 1421452 w 4418271"/>
+              <a:gd name="connsiteY4" fmla="*/ 0 h 718159"/>
+              <a:gd name="connsiteX5" fmla="*/ 3247781 w 4418271"/>
+              <a:gd name="connsiteY5" fmla="*/ 271915 h 718159"/>
+              <a:gd name="connsiteX6" fmla="*/ 4418271 w 4418271"/>
+              <a:gd name="connsiteY6" fmla="*/ 718159 h 718159"/>
+            </a:gdLst>
+            <a:ahLst/>
+            <a:cxnLst>
+              <a:cxn ang="0">
+                <a:pos x="connsiteX0" y="connsiteY0"/>
+              </a:cxn>
+              <a:cxn ang="0">
+                <a:pos x="connsiteX1" y="connsiteY1"/>
+              </a:cxn>
+              <a:cxn ang="0">
+                <a:pos x="connsiteX2" y="connsiteY2"/>
+              </a:cxn>
+              <a:cxn ang="0">
+                <a:pos x="connsiteX3" y="connsiteY3"/>
+              </a:cxn>
+              <a:cxn ang="0">
+                <a:pos x="connsiteX4" y="connsiteY4"/>
+              </a:cxn>
+              <a:cxn ang="0">
+                <a:pos x="connsiteX5" y="connsiteY5"/>
+              </a:cxn>
+              <a:cxn ang="0">
+                <a:pos x="connsiteX6" y="connsiteY6"/>
+              </a:cxn>
+            </a:cxnLst>
+            <a:rect l="l" t="t" r="r" b="b"/>
+            <a:pathLst>
+              <a:path w="4418271" h="718159">
+                <a:moveTo>
+                  <a:pt x="0" y="713930"/>
+                </a:moveTo>
+                <a:lnTo>
+                  <a:pt x="2854" y="705624"/>
+                </a:lnTo>
+                <a:cubicBezTo>
+                  <a:pt x="60059" y="562888"/>
+                  <a:pt x="131373" y="433874"/>
+                  <a:pt x="226680" y="333970"/>
+                </a:cubicBezTo>
+                <a:cubicBezTo>
+                  <a:pt x="463632" y="85526"/>
+                  <a:pt x="822395" y="5774"/>
+                  <a:pt x="1160245" y="1178"/>
+                </a:cubicBezTo>
+                <a:lnTo>
+                  <a:pt x="1421452" y="0"/>
+                </a:lnTo>
+                <a:cubicBezTo>
+                  <a:pt x="2035274" y="3698"/>
+                  <a:pt x="2748311" y="152222"/>
+                  <a:pt x="3247781" y="271915"/>
+                </a:cubicBezTo>
+                <a:cubicBezTo>
+                  <a:pt x="3747251" y="391608"/>
+                  <a:pt x="3902480" y="501606"/>
+                  <a:pt x="4418271" y="718159"/>
+                </a:cubicBezTo>
+              </a:path>
+            </a:pathLst>
+          </a:custGeom>
+          <a:noFill/>
+          <a:ln>
+            <a:solidFill>
+              <a:schemeClr val="accent4"/>
+            </a:solidFill>
+          </a:ln>
+        </p:spPr>
+        <p:style>
+          <a:lnRef idx="2">
+            <a:schemeClr val="accent1">
+              <a:shade val="50000"/>
+            </a:schemeClr>
+          </a:lnRef>
+          <a:fillRef idx="1">
+            <a:schemeClr val="accent1"/>
+          </a:fillRef>
+          <a:effectRef idx="0">
+            <a:schemeClr val="accent1"/>
+          </a:effectRef>
+          <a:fontRef idx="minor">
+            <a:schemeClr val="lt1"/>
+          </a:fontRef>
+        </p:style>
+        <p:txBody>
+          <a:bodyPr rtlCol="0" anchor="ctr"/>
+          <a:lstStyle/>
+          <a:p>
+            <a:pPr marL="0" marR="0" lvl="0" indent="0" algn="ctr" defTabSz="914400" rtl="0" eaLnBrk="1" fontAlgn="auto" latinLnBrk="0" hangingPunct="1">
+              <a:lnSpc>
+                <a:spcPct val="100000"/>
+              </a:lnSpc>
+              <a:spcBef>
+                <a:spcPts val="0"/>
+              </a:spcBef>
+              <a:spcAft>
+                <a:spcPts val="0"/>
+              </a:spcAft>
+              <a:buClrTx/>
+              <a:buSzTx/>
+              <a:buFontTx/>
+              <a:buNone/>
+              <a:tabLst/>
+              <a:defRPr/>
+            </a:pPr>
+            <a:endParaRPr kumimoji="0" lang="en-US" sz="1800" b="0" i="0" u="none" strike="noStrike" kern="1200" cap="none" spc="0" normalizeH="0" baseline="0" noProof="0">
+              <a:ln>
+                <a:noFill/>
+              </a:ln>
+              <a:solidFill>
+                <a:prstClr val="white"/>
+              </a:solidFill>
+              <a:effectLst/>
+              <a:uLnTx/>
+              <a:uFillTx/>
+              <a:latin typeface="Avenir Next LT Pro Light"/>
+              <a:ea typeface="+mn-ea"/>
+              <a:cs typeface="+mn-cs"/>
+            </a:endParaRPr>
+          </a:p>
+        </p:txBody>
+      </p:sp>
+      <p:sp useBgFill="1">
+        <p:nvSpPr>
+          <p:cNvPr id="35" name="Rectangle 34">
+            <a:extLst>
+              <a:ext uri="{FF2B5EF4-FFF2-40B4-BE49-F238E27FC236}">
+                <a16:creationId xmlns:a16="http://schemas.microsoft.com/office/drawing/2014/main" id="{7A18C9FB-EC4C-4DAE-8F7D-C6E5AF607958}"/>
+              </a:ext>
+              <a:ext uri="{C183D7F6-B498-43B3-948B-1728B52AA6E4}">
+                <adec:decorative xmlns:adec="http://schemas.microsoft.com/office/drawing/2017/decorative" val="1"/>
+              </a:ext>
+            </a:extLst>
+          </p:cNvPr>
+          <p:cNvSpPr>
+            <a:spLocks noGrp="1" noRot="1" noChangeAspect="1" noMove="1" noResize="1" noEditPoints="1" noAdjustHandles="1" noChangeArrowheads="1" noChangeShapeType="1" noTextEdit="1"/>
+          </p:cNvSpPr>
+          <p:nvPr>
+            <p:extLst>
+              <p:ext uri="{386F3935-93C4-4BCD-93E2-E3B085C9AB24}">
+                <p16:designElem xmlns:p16="http://schemas.microsoft.com/office/powerpoint/2015/main" val="1"/>
+              </p:ext>
+            </p:extLst>
+          </p:nvPr>
+        </p:nvSpPr>
+        <p:spPr>
+          <a:xfrm>
+            <a:off x="0" y="0"/>
+            <a:ext cx="12192000" cy="6858000"/>
+          </a:xfrm>
+          <a:prstGeom prst="rect">
+            <a:avLst/>
+          </a:prstGeom>
+          <a:ln w="12700" cap="flat" cmpd="sng" algn="ctr">
+            <a:noFill/>
+            <a:prstDash val="solid"/>
+            <a:miter lim="800000"/>
+          </a:ln>
+          <a:effectLst/>
+          <a:extLst>
+            <a:ext uri="{91240B29-F687-4F45-9708-019B960494DF}">
+              <a14:hiddenLine xmlns:a14="http://schemas.microsoft.com/office/drawing/2010/main" w="12700" cap="flat" cmpd="sng" algn="ctr">
+                <a:solidFill>
+                  <a:schemeClr val="accent1">
+                    <a:shade val="50000"/>
+                  </a:schemeClr>
+                </a:solidFill>
+                <a:prstDash val="solid"/>
+                <a:miter lim="800000"/>
+              </a14:hiddenLine>
+            </a:ext>
+          </a:extLst>
+        </p:spPr>
+        <p:style>
+          <a:lnRef idx="2">
+            <a:schemeClr val="accent1">
+              <a:shade val="50000"/>
+            </a:schemeClr>
+          </a:lnRef>
+          <a:fillRef idx="1">
+            <a:schemeClr val="accent1"/>
+          </a:fillRef>
+          <a:effectRef idx="0">
+            <a:schemeClr val="accent1"/>
+          </a:effectRef>
+          <a:fontRef idx="minor">
+            <a:schemeClr val="lt1"/>
+          </a:fontRef>
+        </p:style>
+        <p:txBody>
+          <a:bodyPr rtlCol="0" anchor="ctr"/>
+          <a:lstStyle/>
+          <a:p>
+            <a:endParaRPr lang="en-US" dirty="0"/>
+          </a:p>
+        </p:txBody>
+      </p:sp>
+      <p:sp>
+        <p:nvSpPr>
+          <p:cNvPr id="2" name="Title 1">
+            <a:extLst>
+              <a:ext uri="{FF2B5EF4-FFF2-40B4-BE49-F238E27FC236}">
+                <a16:creationId xmlns:a16="http://schemas.microsoft.com/office/drawing/2014/main" id="{B83AED91-200C-B943-8C3D-624CD878A867}"/>
+              </a:ext>
+            </a:extLst>
+          </p:cNvPr>
+          <p:cNvSpPr>
+            <a:spLocks noGrp="1"/>
+          </p:cNvSpPr>
+          <p:nvPr>
+            <p:ph type="title"/>
+          </p:nvPr>
+        </p:nvSpPr>
+        <p:spPr>
+          <a:xfrm>
+            <a:off x="762000" y="762000"/>
+            <a:ext cx="3810000" cy="3048000"/>
+          </a:xfrm>
+        </p:spPr>
+        <p:txBody>
+          <a:bodyPr vert="horz" lIns="91440" tIns="45720" rIns="91440" bIns="45720" rtlCol="0" anchor="b">
+            <a:normAutofit/>
+          </a:bodyPr>
+          <a:lstStyle/>
+          <a:p>
+            <a:r>
+              <a:rPr lang="en-US" sz="2800" kern="1200" dirty="0">
+                <a:solidFill>
+                  <a:schemeClr val="tx1"/>
+                </a:solidFill>
+                <a:latin typeface="IBM Plex Mono Light" panose="020B0409050203000203" pitchFamily="49" charset="77"/>
+              </a:rPr>
+              <a:t>Control Flow Statement – match </a:t>
+            </a:r>
+            <a:br>
+              <a:rPr lang="en-US" sz="2800" kern="1200" dirty="0">
+                <a:solidFill>
+                  <a:schemeClr val="tx1"/>
+                </a:solidFill>
+                <a:latin typeface="IBM Plex Mono Light" panose="020B0409050203000203" pitchFamily="49" charset="77"/>
+              </a:rPr>
+            </a:br>
+            <a:r>
+              <a:rPr lang="en-US" sz="2000" kern="1200" dirty="0">
+                <a:solidFill>
+                  <a:schemeClr val="tx1"/>
+                </a:solidFill>
+                <a:latin typeface="IBM Plex Mono Light" panose="020B0409050203000203" pitchFamily="49" charset="77"/>
+              </a:rPr>
+              <a:t>=&gt; switch?! </a:t>
+            </a:r>
+            <a:br>
+              <a:rPr lang="en-US" sz="2800" kern="1200" dirty="0">
+                <a:solidFill>
+                  <a:schemeClr val="tx1"/>
+                </a:solidFill>
+                <a:latin typeface="IBM Plex Mono Light" panose="020B0409050203000203" pitchFamily="49" charset="77"/>
+              </a:rPr>
+            </a:br>
+            <a:br>
+              <a:rPr lang="en-US" sz="1100" kern="1200" dirty="0">
+                <a:solidFill>
+                  <a:schemeClr val="tx1"/>
+                </a:solidFill>
+                <a:latin typeface="IBM Plex Mono Light" panose="020B0409050203000203" pitchFamily="49" charset="77"/>
+              </a:rPr>
+            </a:br>
+            <a:r>
+              <a:rPr lang="en-US" sz="1100" kern="1200" dirty="0">
+                <a:solidFill>
+                  <a:schemeClr val="tx1"/>
+                </a:solidFill>
+                <a:latin typeface="IBM Plex Mono Light" panose="020B0409050203000203" pitchFamily="49" charset="77"/>
+              </a:rPr>
+              <a:t>(more powerful?): compiler will throw error for missing combinations!!</a:t>
+            </a:r>
+            <a:endParaRPr lang="en-US" sz="2800" kern="1200" dirty="0">
+              <a:solidFill>
+                <a:schemeClr val="tx1"/>
+              </a:solidFill>
+              <a:latin typeface="IBM Plex Mono Light" panose="020B0409050203000203" pitchFamily="49" charset="77"/>
+            </a:endParaRPr>
+          </a:p>
+        </p:txBody>
+      </p:sp>
+      <p:sp>
+        <p:nvSpPr>
+          <p:cNvPr id="37" name="Freeform: Shape 36">
+            <a:extLst>
+              <a:ext uri="{FF2B5EF4-FFF2-40B4-BE49-F238E27FC236}">
+                <a16:creationId xmlns:a16="http://schemas.microsoft.com/office/drawing/2014/main" id="{F798D3DD-23B7-41EE-9021-C8F9A8E2C19B}"/>
+              </a:ext>
+              <a:ext uri="{C183D7F6-B498-43B3-948B-1728B52AA6E4}">
+                <adec:decorative xmlns:adec="http://schemas.microsoft.com/office/drawing/2017/decorative" val="1"/>
+              </a:ext>
+            </a:extLst>
+          </p:cNvPr>
+          <p:cNvSpPr>
+            <a:spLocks noGrp="1" noRot="1" noChangeAspect="1" noMove="1" noResize="1" noEditPoints="1" noAdjustHandles="1" noChangeArrowheads="1" noChangeShapeType="1" noTextEdit="1"/>
+          </p:cNvSpPr>
+          <p:nvPr>
+            <p:extLst>
+              <p:ext uri="{386F3935-93C4-4BCD-93E2-E3B085C9AB24}">
+                <p16:designElem xmlns:p16="http://schemas.microsoft.com/office/powerpoint/2015/main" val="1"/>
+              </p:ext>
+            </p:extLst>
+          </p:nvPr>
+        </p:nvSpPr>
+        <p:spPr>
+          <a:xfrm rot="16200000" flipH="1">
+            <a:off x="10653162" y="-776838"/>
+            <a:ext cx="762001" cy="2315675"/>
+          </a:xfrm>
+          <a:custGeom>
+            <a:avLst/>
+            <a:gdLst>
+              <a:gd name="connsiteX0" fmla="*/ 0 w 1085312"/>
+              <a:gd name="connsiteY0" fmla="*/ 2315675 h 2315675"/>
+              <a:gd name="connsiteX1" fmla="*/ 0 w 1085312"/>
+              <a:gd name="connsiteY1" fmla="*/ 0 h 2315675"/>
+              <a:gd name="connsiteX2" fmla="*/ 53089 w 1085312"/>
+              <a:gd name="connsiteY2" fmla="*/ 4542 h 2315675"/>
+              <a:gd name="connsiteX3" fmla="*/ 790077 w 1085312"/>
+              <a:gd name="connsiteY3" fmla="*/ 872756 h 2315675"/>
+              <a:gd name="connsiteX4" fmla="*/ 1085252 w 1085312"/>
+              <a:gd name="connsiteY4" fmla="*/ 1943649 h 2315675"/>
+              <a:gd name="connsiteX5" fmla="*/ 1064832 w 1085312"/>
+              <a:gd name="connsiteY5" fmla="*/ 2198094 h 2315675"/>
+              <a:gd name="connsiteX6" fmla="*/ 1043734 w 1085312"/>
+              <a:gd name="connsiteY6" fmla="*/ 2315675 h 2315675"/>
+              <a:gd name="connsiteX7" fmla="*/ 0 w 1085312"/>
+              <a:gd name="connsiteY7" fmla="*/ 2315675 h 2315675"/>
+            </a:gdLst>
+            <a:ahLst/>
+            <a:cxnLst>
+              <a:cxn ang="0">
+                <a:pos x="connsiteX0" y="connsiteY0"/>
+              </a:cxn>
+              <a:cxn ang="0">
+                <a:pos x="connsiteX1" y="connsiteY1"/>
+              </a:cxn>
+              <a:cxn ang="0">
+                <a:pos x="connsiteX2" y="connsiteY2"/>
+              </a:cxn>
+              <a:cxn ang="0">
+                <a:pos x="connsiteX3" y="connsiteY3"/>
+              </a:cxn>
+              <a:cxn ang="0">
+                <a:pos x="connsiteX4" y="connsiteY4"/>
+              </a:cxn>
+              <a:cxn ang="0">
+                <a:pos x="connsiteX5" y="connsiteY5"/>
+              </a:cxn>
+              <a:cxn ang="0">
+                <a:pos x="connsiteX6" y="connsiteY6"/>
+              </a:cxn>
+              <a:cxn ang="0">
+                <a:pos x="connsiteX7" y="connsiteY7"/>
+              </a:cxn>
+            </a:cxnLst>
+            <a:rect l="l" t="t" r="r" b="b"/>
+            <a:pathLst>
+              <a:path w="1085312" h="2315675">
+                <a:moveTo>
+                  <a:pt x="0" y="2315675"/>
+                </a:moveTo>
+                <a:lnTo>
+                  <a:pt x="0" y="0"/>
+                </a:lnTo>
+                <a:lnTo>
+                  <a:pt x="53089" y="4542"/>
+                </a:lnTo>
+                <a:cubicBezTo>
+                  <a:pt x="405263" y="73503"/>
+                  <a:pt x="612623" y="486635"/>
+                  <a:pt x="790077" y="872756"/>
+                </a:cubicBezTo>
+                <a:cubicBezTo>
+                  <a:pt x="937425" y="1193596"/>
+                  <a:pt x="1088787" y="1533232"/>
+                  <a:pt x="1085252" y="1943649"/>
+                </a:cubicBezTo>
+                <a:cubicBezTo>
+                  <a:pt x="1084528" y="2029058"/>
+                  <a:pt x="1077341" y="2113833"/>
+                  <a:pt x="1064832" y="2198094"/>
+                </a:cubicBezTo>
+                <a:lnTo>
+                  <a:pt x="1043734" y="2315675"/>
+                </a:lnTo>
+                <a:lnTo>
+                  <a:pt x="0" y="2315675"/>
+                </a:lnTo>
+                <a:close/>
+              </a:path>
+            </a:pathLst>
+          </a:custGeom>
+          <a:solidFill>
+            <a:schemeClr val="accent1"/>
+          </a:solidFill>
+          <a:ln>
+            <a:noFill/>
+          </a:ln>
+        </p:spPr>
+        <p:style>
+          <a:lnRef idx="2">
+            <a:schemeClr val="accent1">
+              <a:shade val="50000"/>
+            </a:schemeClr>
+          </a:lnRef>
+          <a:fillRef idx="1">
+            <a:schemeClr val="accent1"/>
+          </a:fillRef>
+          <a:effectRef idx="0">
+            <a:schemeClr val="accent1"/>
+          </a:effectRef>
+          <a:fontRef idx="minor">
+            <a:schemeClr val="lt1"/>
+          </a:fontRef>
+        </p:style>
+        <p:txBody>
+          <a:bodyPr rtlCol="0" anchor="ctr"/>
+          <a:lstStyle/>
+          <a:p>
+            <a:pPr algn="ctr"/>
+            <a:endParaRPr lang="en-US" sz="900">
+              <a:solidFill>
+                <a:prstClr val="white"/>
+              </a:solidFill>
+              <a:latin typeface="Avenir Next LT Pro" panose="020B0504020202020204" pitchFamily="34" charset="0"/>
+            </a:endParaRPr>
+          </a:p>
+        </p:txBody>
+      </p:sp>
+      <p:grpSp>
+        <p:nvGrpSpPr>
+          <p:cNvPr id="39" name="Group 38">
+            <a:extLst>
+              <a:ext uri="{FF2B5EF4-FFF2-40B4-BE49-F238E27FC236}">
+                <a16:creationId xmlns:a16="http://schemas.microsoft.com/office/drawing/2014/main" id="{2C072688-BFC7-4FE8-A45E-B3C63CBB9632}"/>
+              </a:ext>
+              <a:ext uri="{C183D7F6-B498-43B3-948B-1728B52AA6E4}">
+                <adec:decorative xmlns:adec="http://schemas.microsoft.com/office/drawing/2017/decorative" val="1"/>
+              </a:ext>
+            </a:extLst>
+          </p:cNvPr>
+          <p:cNvGrpSpPr>
+            <a:grpSpLocks noGrp="1" noUngrp="1" noRot="1" noChangeAspect="1" noMove="1" noResize="1"/>
+          </p:cNvGrpSpPr>
+          <p:nvPr>
+            <p:extLst>
+              <p:ext uri="{386F3935-93C4-4BCD-93E2-E3B085C9AB24}">
+                <p16:designElem xmlns:p16="http://schemas.microsoft.com/office/powerpoint/2015/main" val="1"/>
+              </p:ext>
+            </p:extLst>
+          </p:nvPr>
+        </p:nvGrpSpPr>
+        <p:grpSpPr>
+          <a:xfrm flipH="1">
+            <a:off x="-1" y="5829359"/>
+            <a:ext cx="4333875" cy="1028642"/>
+            <a:chOff x="7153921" y="5829359"/>
+            <a:chExt cx="5038079" cy="1028642"/>
+          </a:xfrm>
+        </p:grpSpPr>
+        <p:sp>
+          <p:nvSpPr>
+            <p:cNvPr id="40" name="Freeform: Shape 39">
+              <a:extLst>
+                <a:ext uri="{FF2B5EF4-FFF2-40B4-BE49-F238E27FC236}">
+                  <a16:creationId xmlns:a16="http://schemas.microsoft.com/office/drawing/2014/main" id="{F3002ED9-43C6-4BA8-8941-9AFCB04E4D77}"/>
+                </a:ext>
+                <a:ext uri="{C183D7F6-B498-43B3-948B-1728B52AA6E4}">
+                  <adec:decorative xmlns:adec="http://schemas.microsoft.com/office/drawing/2017/decorative" val="1"/>
+                </a:ext>
+              </a:extLst>
+            </p:cNvPr>
+            <p:cNvSpPr/>
+            <p:nvPr>
+              <p:extLst>
+                <p:ext uri="{386F3935-93C4-4BCD-93E2-E3B085C9AB24}">
+                  <p16:designElem xmlns:p16="http://schemas.microsoft.com/office/powerpoint/2015/main" val="1"/>
+                </p:ext>
+              </p:extLst>
+            </p:nvPr>
+          </p:nvSpPr>
+          <p:spPr>
+            <a:xfrm>
+              <a:off x="7963906" y="5913098"/>
+              <a:ext cx="4228094" cy="944903"/>
+            </a:xfrm>
+            <a:custGeom>
+              <a:avLst/>
+              <a:gdLst>
+                <a:gd name="connsiteX0" fmla="*/ 1673074 w 4228094"/>
+                <a:gd name="connsiteY0" fmla="*/ 230 h 1137038"/>
+                <a:gd name="connsiteX1" fmla="*/ 3676781 w 4228094"/>
+                <a:gd name="connsiteY1" fmla="*/ 298555 h 1137038"/>
+                <a:gd name="connsiteX2" fmla="*/ 4025527 w 4228094"/>
+                <a:gd name="connsiteY2" fmla="*/ 425010 h 1137038"/>
+                <a:gd name="connsiteX3" fmla="*/ 4228094 w 4228094"/>
+                <a:gd name="connsiteY3" fmla="*/ 494088 h 1137038"/>
+                <a:gd name="connsiteX4" fmla="*/ 4228094 w 4228094"/>
+                <a:gd name="connsiteY4" fmla="*/ 1137038 h 1137038"/>
+                <a:gd name="connsiteX5" fmla="*/ 0 w 4228094"/>
+                <a:gd name="connsiteY5" fmla="*/ 1137038 h 1137038"/>
+                <a:gd name="connsiteX6" fmla="*/ 18109 w 4228094"/>
+                <a:gd name="connsiteY6" fmla="*/ 1068877 h 1137038"/>
+                <a:gd name="connsiteX7" fmla="*/ 362264 w 4228094"/>
+                <a:gd name="connsiteY7" fmla="*/ 366637 h 1137038"/>
+                <a:gd name="connsiteX8" fmla="*/ 1386499 w 4228094"/>
+                <a:gd name="connsiteY8" fmla="*/ 1522 h 1137038"/>
+                <a:gd name="connsiteX9" fmla="*/ 1673074 w 4228094"/>
+                <a:gd name="connsiteY9" fmla="*/ 230 h 1137038"/>
+              </a:gdLst>
+              <a:ahLst/>
+              <a:cxnLst>
+                <a:cxn ang="0">
+                  <a:pos x="connsiteX0" y="connsiteY0"/>
+                </a:cxn>
+                <a:cxn ang="0">
+                  <a:pos x="connsiteX1" y="connsiteY1"/>
+                </a:cxn>
+                <a:cxn ang="0">
+                  <a:pos x="connsiteX2" y="connsiteY2"/>
+                </a:cxn>
+                <a:cxn ang="0">
+                  <a:pos x="connsiteX3" y="connsiteY3"/>
+                </a:cxn>
+                <a:cxn ang="0">
+                  <a:pos x="connsiteX4" y="connsiteY4"/>
+                </a:cxn>
+                <a:cxn ang="0">
+                  <a:pos x="connsiteX5" y="connsiteY5"/>
+                </a:cxn>
+                <a:cxn ang="0">
+                  <a:pos x="connsiteX6" y="connsiteY6"/>
+                </a:cxn>
+                <a:cxn ang="0">
+                  <a:pos x="connsiteX7" y="connsiteY7"/>
+                </a:cxn>
+                <a:cxn ang="0">
+                  <a:pos x="connsiteX8" y="connsiteY8"/>
+                </a:cxn>
+                <a:cxn ang="0">
+                  <a:pos x="connsiteX9" y="connsiteY9"/>
+                </a:cxn>
+              </a:cxnLst>
+              <a:rect l="l" t="t" r="r" b="b"/>
+              <a:pathLst>
+                <a:path w="4228094" h="1137038">
+                  <a:moveTo>
+                    <a:pt x="1673074" y="230"/>
+                  </a:moveTo>
+                  <a:cubicBezTo>
+                    <a:pt x="2346512" y="4287"/>
+                    <a:pt x="3048424" y="63583"/>
+                    <a:pt x="3676781" y="298555"/>
+                  </a:cubicBezTo>
+                  <a:cubicBezTo>
+                    <a:pt x="3793275" y="342114"/>
+                    <a:pt x="3909477" y="384216"/>
+                    <a:pt x="4025527" y="425010"/>
+                  </a:cubicBezTo>
+                  <a:lnTo>
+                    <a:pt x="4228094" y="494088"/>
+                  </a:lnTo>
+                  <a:lnTo>
+                    <a:pt x="4228094" y="1137038"/>
+                  </a:lnTo>
+                  <a:lnTo>
+                    <a:pt x="0" y="1137038"/>
+                  </a:lnTo>
+                  <a:lnTo>
+                    <a:pt x="18109" y="1068877"/>
+                  </a:lnTo>
+                  <a:cubicBezTo>
+                    <a:pt x="95047" y="799139"/>
+                    <a:pt x="194962" y="542008"/>
+                    <a:pt x="362264" y="366637"/>
+                  </a:cubicBezTo>
+                  <a:cubicBezTo>
+                    <a:pt x="622229" y="94062"/>
+                    <a:pt x="1015836" y="6565"/>
+                    <a:pt x="1386499" y="1522"/>
+                  </a:cubicBezTo>
+                  <a:cubicBezTo>
+                    <a:pt x="1481245" y="198"/>
+                    <a:pt x="1576869" y="-349"/>
+                    <a:pt x="1673074" y="230"/>
+                  </a:cubicBezTo>
+                  <a:close/>
+                </a:path>
+              </a:pathLst>
+            </a:custGeom>
+            <a:solidFill>
+              <a:schemeClr val="accent6"/>
+            </a:solidFill>
+            <a:ln>
+              <a:noFill/>
+            </a:ln>
+          </p:spPr>
+          <p:style>
+            <a:lnRef idx="2">
+              <a:schemeClr val="accent1">
+                <a:shade val="50000"/>
+              </a:schemeClr>
+            </a:lnRef>
+            <a:fillRef idx="1">
+              <a:schemeClr val="accent1"/>
+            </a:fillRef>
+            <a:effectRef idx="0">
+              <a:schemeClr val="accent1"/>
+            </a:effectRef>
+            <a:fontRef idx="minor">
+              <a:schemeClr val="lt1"/>
+            </a:fontRef>
+          </p:style>
+          <p:txBody>
+            <a:bodyPr rtlCol="0" anchor="ctr"/>
+            <a:lstStyle/>
+            <a:p>
+              <a:pPr lvl="0" algn="ctr"/>
+              <a:endParaRPr lang="en-US" sz="1500">
+                <a:solidFill>
+                  <a:schemeClr val="bg1"/>
+                </a:solidFill>
+                <a:latin typeface="Avenir Next LT Pro" panose="020B0504020202020204" pitchFamily="34" charset="0"/>
+              </a:endParaRPr>
+            </a:p>
+          </p:txBody>
+        </p:sp>
+        <p:sp>
+          <p:nvSpPr>
+            <p:cNvPr id="41" name="Freeform: Shape 40">
+              <a:extLst>
+                <a:ext uri="{FF2B5EF4-FFF2-40B4-BE49-F238E27FC236}">
+                  <a16:creationId xmlns:a16="http://schemas.microsoft.com/office/drawing/2014/main" id="{4EB09750-C9B1-40CE-AB9B-FEB308A1F312}"/>
+                </a:ext>
+                <a:ext uri="{C183D7F6-B498-43B3-948B-1728B52AA6E4}">
+                  <adec:decorative xmlns:adec="http://schemas.microsoft.com/office/drawing/2017/decorative" val="1"/>
+                </a:ext>
+              </a:extLst>
+            </p:cNvPr>
+            <p:cNvSpPr/>
+            <p:nvPr>
+              <p:extLst>
+                <p:ext uri="{386F3935-93C4-4BCD-93E2-E3B085C9AB24}">
+                  <p16:designElem xmlns:p16="http://schemas.microsoft.com/office/powerpoint/2015/main" val="1"/>
+                </p:ext>
+              </p:extLst>
+            </p:nvPr>
+          </p:nvSpPr>
+          <p:spPr>
+            <a:xfrm>
+              <a:off x="7153921" y="5829359"/>
+              <a:ext cx="5038078" cy="1028642"/>
+            </a:xfrm>
+            <a:custGeom>
+              <a:avLst/>
+              <a:gdLst>
+                <a:gd name="connsiteX0" fmla="*/ 1576991 w 5038078"/>
+                <a:gd name="connsiteY0" fmla="*/ 210 h 1238015"/>
+                <a:gd name="connsiteX1" fmla="*/ 3403320 w 5038078"/>
+                <a:gd name="connsiteY1" fmla="*/ 272125 h 1238015"/>
+                <a:gd name="connsiteX2" fmla="*/ 4672870 w 5038078"/>
+                <a:gd name="connsiteY2" fmla="*/ 693604 h 1238015"/>
+                <a:gd name="connsiteX3" fmla="*/ 5038078 w 5038078"/>
+                <a:gd name="connsiteY3" fmla="*/ 795929 h 1238015"/>
+                <a:gd name="connsiteX4" fmla="*/ 5038078 w 5038078"/>
+                <a:gd name="connsiteY4" fmla="*/ 1238015 h 1238015"/>
+                <a:gd name="connsiteX5" fmla="*/ 0 w 5038078"/>
+                <a:gd name="connsiteY5" fmla="*/ 1238015 h 1238015"/>
+                <a:gd name="connsiteX6" fmla="*/ 19230 w 5038078"/>
+                <a:gd name="connsiteY6" fmla="*/ 1159819 h 1238015"/>
+                <a:gd name="connsiteX7" fmla="*/ 382219 w 5038078"/>
+                <a:gd name="connsiteY7" fmla="*/ 334180 h 1238015"/>
+                <a:gd name="connsiteX8" fmla="*/ 1315784 w 5038078"/>
+                <a:gd name="connsiteY8" fmla="*/ 1388 h 1238015"/>
+                <a:gd name="connsiteX9" fmla="*/ 1576991 w 5038078"/>
+                <a:gd name="connsiteY9" fmla="*/ 210 h 1238015"/>
+                <a:gd name="connsiteX0" fmla="*/ 0 w 5129518"/>
+                <a:gd name="connsiteY0" fmla="*/ 1237805 h 1329245"/>
+                <a:gd name="connsiteX1" fmla="*/ 19230 w 5129518"/>
+                <a:gd name="connsiteY1" fmla="*/ 1159609 h 1329245"/>
+                <a:gd name="connsiteX2" fmla="*/ 382219 w 5129518"/>
+                <a:gd name="connsiteY2" fmla="*/ 333970 h 1329245"/>
+                <a:gd name="connsiteX3" fmla="*/ 1315784 w 5129518"/>
+                <a:gd name="connsiteY3" fmla="*/ 1178 h 1329245"/>
+                <a:gd name="connsiteX4" fmla="*/ 1576991 w 5129518"/>
+                <a:gd name="connsiteY4" fmla="*/ 0 h 1329245"/>
+                <a:gd name="connsiteX5" fmla="*/ 3403320 w 5129518"/>
+                <a:gd name="connsiteY5" fmla="*/ 271915 h 1329245"/>
+                <a:gd name="connsiteX6" fmla="*/ 4672870 w 5129518"/>
+                <a:gd name="connsiteY6" fmla="*/ 693394 h 1329245"/>
+                <a:gd name="connsiteX7" fmla="*/ 5038078 w 5129518"/>
+                <a:gd name="connsiteY7" fmla="*/ 795719 h 1329245"/>
+                <a:gd name="connsiteX8" fmla="*/ 5129518 w 5129518"/>
+                <a:gd name="connsiteY8" fmla="*/ 1329245 h 1329245"/>
+                <a:gd name="connsiteX0" fmla="*/ 0 w 5129518"/>
+                <a:gd name="connsiteY0" fmla="*/ 1237805 h 1329245"/>
+                <a:gd name="connsiteX1" fmla="*/ 19230 w 5129518"/>
+                <a:gd name="connsiteY1" fmla="*/ 1159609 h 1329245"/>
+                <a:gd name="connsiteX2" fmla="*/ 382219 w 5129518"/>
+                <a:gd name="connsiteY2" fmla="*/ 333970 h 1329245"/>
+                <a:gd name="connsiteX3" fmla="*/ 1315784 w 5129518"/>
+                <a:gd name="connsiteY3" fmla="*/ 1178 h 1329245"/>
+                <a:gd name="connsiteX4" fmla="*/ 1576991 w 5129518"/>
+                <a:gd name="connsiteY4" fmla="*/ 0 h 1329245"/>
+                <a:gd name="connsiteX5" fmla="*/ 3403320 w 5129518"/>
+                <a:gd name="connsiteY5" fmla="*/ 271915 h 1329245"/>
+                <a:gd name="connsiteX6" fmla="*/ 4672870 w 5129518"/>
+                <a:gd name="connsiteY6" fmla="*/ 693394 h 1329245"/>
+                <a:gd name="connsiteX7" fmla="*/ 5038078 w 5129518"/>
+                <a:gd name="connsiteY7" fmla="*/ 795719 h 1329245"/>
+                <a:gd name="connsiteX8" fmla="*/ 5129518 w 5129518"/>
+                <a:gd name="connsiteY8" fmla="*/ 1329245 h 1329245"/>
+                <a:gd name="connsiteX0" fmla="*/ 0 w 5049689"/>
+                <a:gd name="connsiteY0" fmla="*/ 1237805 h 1423588"/>
+                <a:gd name="connsiteX1" fmla="*/ 19230 w 5049689"/>
+                <a:gd name="connsiteY1" fmla="*/ 1159609 h 1423588"/>
+                <a:gd name="connsiteX2" fmla="*/ 382219 w 5049689"/>
+                <a:gd name="connsiteY2" fmla="*/ 333970 h 1423588"/>
+                <a:gd name="connsiteX3" fmla="*/ 1315784 w 5049689"/>
+                <a:gd name="connsiteY3" fmla="*/ 1178 h 1423588"/>
+                <a:gd name="connsiteX4" fmla="*/ 1576991 w 5049689"/>
+                <a:gd name="connsiteY4" fmla="*/ 0 h 1423588"/>
+                <a:gd name="connsiteX5" fmla="*/ 3403320 w 5049689"/>
+                <a:gd name="connsiteY5" fmla="*/ 271915 h 1423588"/>
+                <a:gd name="connsiteX6" fmla="*/ 4672870 w 5049689"/>
+                <a:gd name="connsiteY6" fmla="*/ 693394 h 1423588"/>
+                <a:gd name="connsiteX7" fmla="*/ 5038078 w 5049689"/>
+                <a:gd name="connsiteY7" fmla="*/ 795719 h 1423588"/>
+                <a:gd name="connsiteX8" fmla="*/ 5049689 w 5049689"/>
+                <a:gd name="connsiteY8" fmla="*/ 1423588 h 1423588"/>
+                <a:gd name="connsiteX0" fmla="*/ 0 w 5038078"/>
+                <a:gd name="connsiteY0" fmla="*/ 1237805 h 1237805"/>
+                <a:gd name="connsiteX1" fmla="*/ 19230 w 5038078"/>
+                <a:gd name="connsiteY1" fmla="*/ 1159609 h 1237805"/>
+                <a:gd name="connsiteX2" fmla="*/ 382219 w 5038078"/>
+                <a:gd name="connsiteY2" fmla="*/ 333970 h 1237805"/>
+                <a:gd name="connsiteX3" fmla="*/ 1315784 w 5038078"/>
+                <a:gd name="connsiteY3" fmla="*/ 1178 h 1237805"/>
+                <a:gd name="connsiteX4" fmla="*/ 1576991 w 5038078"/>
+                <a:gd name="connsiteY4" fmla="*/ 0 h 1237805"/>
+                <a:gd name="connsiteX5" fmla="*/ 3403320 w 5038078"/>
+                <a:gd name="connsiteY5" fmla="*/ 271915 h 1237805"/>
+                <a:gd name="connsiteX6" fmla="*/ 4672870 w 5038078"/>
+                <a:gd name="connsiteY6" fmla="*/ 693394 h 1237805"/>
+                <a:gd name="connsiteX7" fmla="*/ 5038078 w 5038078"/>
+                <a:gd name="connsiteY7" fmla="*/ 795719 h 1237805"/>
+              </a:gdLst>
+              <a:ahLst/>
+              <a:cxnLst>
+                <a:cxn ang="0">
+                  <a:pos x="connsiteX0" y="connsiteY0"/>
+                </a:cxn>
+                <a:cxn ang="0">
+                  <a:pos x="connsiteX1" y="connsiteY1"/>
+                </a:cxn>
+                <a:cxn ang="0">
+                  <a:pos x="connsiteX2" y="connsiteY2"/>
+                </a:cxn>
+                <a:cxn ang="0">
+                  <a:pos x="connsiteX3" y="connsiteY3"/>
+                </a:cxn>
+                <a:cxn ang="0">
+                  <a:pos x="connsiteX4" y="connsiteY4"/>
+                </a:cxn>
+                <a:cxn ang="0">
+                  <a:pos x="connsiteX5" y="connsiteY5"/>
+                </a:cxn>
+                <a:cxn ang="0">
+                  <a:pos x="connsiteX6" y="connsiteY6"/>
+                </a:cxn>
+                <a:cxn ang="0">
+                  <a:pos x="connsiteX7" y="connsiteY7"/>
+                </a:cxn>
+              </a:cxnLst>
+              <a:rect l="l" t="t" r="r" b="b"/>
+              <a:pathLst>
+                <a:path w="5038078" h="1237805">
+                  <a:moveTo>
+                    <a:pt x="0" y="1237805"/>
+                  </a:moveTo>
+                  <a:lnTo>
+                    <a:pt x="19230" y="1159609"/>
+                  </a:lnTo>
+                  <a:cubicBezTo>
+                    <a:pt x="96961" y="850027"/>
+                    <a:pt x="191605" y="533778"/>
+                    <a:pt x="382219" y="333970"/>
+                  </a:cubicBezTo>
+                  <a:cubicBezTo>
+                    <a:pt x="619171" y="85526"/>
+                    <a:pt x="977934" y="5774"/>
+                    <a:pt x="1315784" y="1178"/>
+                  </a:cubicBezTo>
+                  <a:lnTo>
+                    <a:pt x="1576991" y="0"/>
+                  </a:lnTo>
+                  <a:cubicBezTo>
+                    <a:pt x="2190813" y="3698"/>
+                    <a:pt x="2830589" y="57744"/>
+                    <a:pt x="3403320" y="271915"/>
+                  </a:cubicBezTo>
+                  <a:cubicBezTo>
+                    <a:pt x="3828046" y="430728"/>
+                    <a:pt x="4248519" y="568281"/>
+                    <a:pt x="4672870" y="693394"/>
+                  </a:cubicBezTo>
+                  <a:lnTo>
+                    <a:pt x="5038078" y="795719"/>
+                  </a:lnTo>
+                </a:path>
+              </a:pathLst>
+            </a:custGeom>
+            <a:noFill/>
+            <a:ln w="19050">
+              <a:solidFill>
+                <a:schemeClr val="accent2">
+                  <a:lumMod val="60000"/>
+                  <a:lumOff val="40000"/>
+                </a:schemeClr>
+              </a:solidFill>
+            </a:ln>
+          </p:spPr>
+          <p:style>
+            <a:lnRef idx="2">
+              <a:schemeClr val="accent1">
+                <a:shade val="50000"/>
+              </a:schemeClr>
+            </a:lnRef>
+            <a:fillRef idx="1">
+              <a:schemeClr val="accent1"/>
+            </a:fillRef>
+            <a:effectRef idx="0">
+              <a:schemeClr val="accent1"/>
+            </a:effectRef>
+            <a:fontRef idx="minor">
+              <a:schemeClr val="lt1"/>
+            </a:fontRef>
+          </p:style>
+          <p:txBody>
+            <a:bodyPr rtlCol="0" anchor="ctr"/>
+            <a:lstStyle/>
+            <a:p>
+              <a:pPr algn="ctr"/>
+              <a:endParaRPr lang="en-US">
+                <a:solidFill>
+                  <a:prstClr val="white"/>
+                </a:solidFill>
+                <a:latin typeface="Avenir Next LT Pro Light"/>
+              </a:endParaRPr>
+            </a:p>
+          </p:txBody>
+        </p:sp>
+      </p:grpSp>
+      <p:pic>
+        <p:nvPicPr>
+          <p:cNvPr id="11" name="Content Placeholder 10" descr="Text&#10;&#10;Description automatically generated">
+            <a:extLst>
+              <a:ext uri="{FF2B5EF4-FFF2-40B4-BE49-F238E27FC236}">
+                <a16:creationId xmlns:a16="http://schemas.microsoft.com/office/drawing/2014/main" id="{0CE08469-0B9E-B44B-82BE-CF140E790F9A}"/>
+              </a:ext>
+            </a:extLst>
+          </p:cNvPr>
+          <p:cNvPicPr>
+            <a:picLocks noGrp="1" noChangeAspect="1"/>
+          </p:cNvPicPr>
+          <p:nvPr>
+            <p:ph idx="1"/>
+          </p:nvPr>
+        </p:nvPicPr>
+        <p:blipFill rotWithShape="1">
+          <a:blip r:embed="rId3"/>
+          <a:srcRect t="4372"/>
+          <a:stretch/>
+        </p:blipFill>
+        <p:spPr>
+          <a:xfrm>
+            <a:off x="5334000" y="762000"/>
+            <a:ext cx="6096000" cy="5333999"/>
+          </a:xfrm>
+          <a:prstGeom prst="rect">
+            <a:avLst/>
+          </a:prstGeom>
+        </p:spPr>
+      </p:pic>
+    </p:spTree>
+    <p:extLst>
+      <p:ext uri="{BB962C8B-B14F-4D97-AF65-F5344CB8AC3E}">
+        <p14:creationId xmlns:p14="http://schemas.microsoft.com/office/powerpoint/2010/main" val="2436066048"/>
+      </p:ext>
+    </p:extLst>
+  </p:cSld>
+  <p:clrMapOvr>
+    <a:masterClrMapping/>
+  </p:clrMapOvr>
+</p:sld>
+</file>
+
+<file path=ppt/slides/slide21.xml><?xml version="1.0" encoding="utf-8"?>
+<p:sld xmlns:a="http://schemas.openxmlformats.org/drawingml/2006/main" xmlns:r="http://schemas.openxmlformats.org/officeDocument/2006/relationships" xmlns:p="http://schemas.openxmlformats.org/presentationml/2006/main">
+  <p:cSld>
+    <p:spTree>
+      <p:nvGrpSpPr>
+        <p:cNvPr id="1" name=""/>
+        <p:cNvGrpSpPr/>
+        <p:nvPr/>
+      </p:nvGrpSpPr>
+      <p:grpSpPr>
+        <a:xfrm>
+          <a:off x="0" y="0"/>
+          <a:ext cx="0" cy="0"/>
+          <a:chOff x="0" y="0"/>
+          <a:chExt cx="0" cy="0"/>
+        </a:xfrm>
+      </p:grpSpPr>
+      <p:sp>
+        <p:nvSpPr>
+          <p:cNvPr id="2" name="Title 1">
+            <a:extLst>
+              <a:ext uri="{FF2B5EF4-FFF2-40B4-BE49-F238E27FC236}">
+                <a16:creationId xmlns:a16="http://schemas.microsoft.com/office/drawing/2014/main" id="{B83AED91-200C-B943-8C3D-624CD878A867}"/>
+              </a:ext>
+            </a:extLst>
+          </p:cNvPr>
+          <p:cNvSpPr>
+            <a:spLocks noGrp="1"/>
+          </p:cNvSpPr>
+          <p:nvPr>
+            <p:ph type="title"/>
+          </p:nvPr>
+        </p:nvSpPr>
+        <p:spPr/>
+        <p:txBody>
+          <a:bodyPr/>
+          <a:lstStyle/>
+          <a:p>
+            <a:r>
+              <a:rPr lang="en-US" dirty="0">
+                <a:latin typeface="IBM Plex Mono Light" panose="020B0409050203000203" pitchFamily="49" charset="77"/>
+              </a:rPr>
+              <a:t>Control Flow Statement </a:t>
+            </a:r>
+            <a:r>
+              <a:rPr lang="en-US" sz="1200" dirty="0">
+                <a:latin typeface="IBM Plex Mono Light" panose="020B0409050203000203" pitchFamily="49" charset="77"/>
+              </a:rPr>
+              <a:t>– loop &amp; break</a:t>
+            </a:r>
+            <a:endParaRPr lang="en-US" dirty="0">
+              <a:latin typeface="IBM Plex Mono Light" panose="020B0409050203000203" pitchFamily="49" charset="77"/>
+            </a:endParaRPr>
+          </a:p>
+        </p:txBody>
+      </p:sp>
+      <p:sp>
+        <p:nvSpPr>
+          <p:cNvPr id="3" name="Content Placeholder 2">
+            <a:extLst>
+              <a:ext uri="{FF2B5EF4-FFF2-40B4-BE49-F238E27FC236}">
+                <a16:creationId xmlns:a16="http://schemas.microsoft.com/office/drawing/2014/main" id="{92055E4C-5037-C643-8CDF-EE5F5A45DE0C}"/>
+              </a:ext>
+            </a:extLst>
+          </p:cNvPr>
+          <p:cNvSpPr>
+            <a:spLocks noGrp="1"/>
+          </p:cNvSpPr>
+          <p:nvPr>
+            <p:ph idx="1"/>
+          </p:nvPr>
+        </p:nvSpPr>
+        <p:spPr/>
+        <p:txBody>
+          <a:bodyPr>
+            <a:normAutofit fontScale="77500" lnSpcReduction="20000"/>
+          </a:bodyPr>
+          <a:lstStyle/>
+          <a:p>
+            <a:pPr marL="0" indent="0">
+              <a:buNone/>
+            </a:pPr>
+            <a:r>
+              <a:rPr lang="en-US" dirty="0">
+                <a:latin typeface="IBM Plex Mono Light" panose="020B0409050203000203" pitchFamily="49" charset="77"/>
+              </a:rPr>
+              <a:t>loop {</a:t>
+            </a:r>
+          </a:p>
+          <a:p>
+            <a:pPr marL="0" indent="0">
+              <a:buNone/>
+            </a:pPr>
+            <a:r>
+              <a:rPr lang="en-US" dirty="0">
+                <a:latin typeface="IBM Plex Mono Light" panose="020B0409050203000203" pitchFamily="49" charset="77"/>
+              </a:rPr>
+              <a:t>	run forever;</a:t>
+            </a:r>
+          </a:p>
+          <a:p>
+            <a:pPr marL="0" indent="0">
+              <a:buNone/>
+            </a:pPr>
+            <a:r>
+              <a:rPr lang="en-US" dirty="0">
+                <a:latin typeface="IBM Plex Mono Light" panose="020B0409050203000203" pitchFamily="49" charset="77"/>
+              </a:rPr>
+              <a:t>}</a:t>
+            </a:r>
+          </a:p>
+          <a:p>
+            <a:pPr marL="0" indent="0">
+              <a:buNone/>
+            </a:pPr>
+            <a:endParaRPr lang="en-US" dirty="0">
+              <a:latin typeface="IBM Plex Mono Light" panose="020B0409050203000203" pitchFamily="49" charset="77"/>
+            </a:endParaRPr>
+          </a:p>
+          <a:p>
+            <a:pPr marL="0" indent="0">
+              <a:buNone/>
+            </a:pPr>
+            <a:r>
+              <a:rPr lang="en-US" dirty="0">
+                <a:latin typeface="IBM Plex Mono Light" panose="020B0409050203000203" pitchFamily="49" charset="77"/>
+              </a:rPr>
+              <a:t>Loop {</a:t>
+            </a:r>
+          </a:p>
+          <a:p>
+            <a:pPr marL="0" indent="0">
+              <a:buNone/>
+            </a:pPr>
+            <a:r>
+              <a:rPr lang="en-US" dirty="0">
+                <a:latin typeface="IBM Plex Mono Light" panose="020B0409050203000203" pitchFamily="49" charset="77"/>
+              </a:rPr>
+              <a:t>	..</a:t>
+            </a:r>
+          </a:p>
+          <a:p>
+            <a:pPr marL="0" indent="0">
+              <a:buNone/>
+            </a:pPr>
+            <a:r>
+              <a:rPr lang="en-US" dirty="0">
+                <a:latin typeface="IBM Plex Mono Light" panose="020B0409050203000203" pitchFamily="49" charset="77"/>
+              </a:rPr>
+              <a:t>	break;</a:t>
+            </a:r>
+          </a:p>
+          <a:p>
+            <a:pPr marL="0" indent="0">
+              <a:buNone/>
+            </a:pPr>
+            <a:r>
+              <a:rPr lang="en-US" dirty="0">
+                <a:latin typeface="IBM Plex Mono Light" panose="020B0409050203000203" pitchFamily="49" charset="77"/>
+              </a:rPr>
+              <a:t>}</a:t>
+            </a:r>
+          </a:p>
+        </p:txBody>
+      </p:sp>
+    </p:spTree>
+    <p:extLst>
+      <p:ext uri="{BB962C8B-B14F-4D97-AF65-F5344CB8AC3E}">
+        <p14:creationId xmlns:p14="http://schemas.microsoft.com/office/powerpoint/2010/main" val="797016690"/>
+      </p:ext>
+    </p:extLst>
+  </p:cSld>
+  <p:clrMapOvr>
+    <a:masterClrMapping/>
+  </p:clrMapOvr>
+</p:sld>
+</file>
+
+<file path=ppt/slides/slide22.xml><?xml version="1.0" encoding="utf-8"?>
+<p:sld xmlns:a="http://schemas.openxmlformats.org/drawingml/2006/main" xmlns:r="http://schemas.openxmlformats.org/officeDocument/2006/relationships" xmlns:p="http://schemas.openxmlformats.org/presentationml/2006/main">
+  <p:cSld>
+    <p:spTree>
+      <p:nvGrpSpPr>
+        <p:cNvPr id="1" name=""/>
+        <p:cNvGrpSpPr/>
+        <p:nvPr/>
+      </p:nvGrpSpPr>
+      <p:grpSpPr>
+        <a:xfrm>
+          <a:off x="0" y="0"/>
+          <a:ext cx="0" cy="0"/>
+          <a:chOff x="0" y="0"/>
+          <a:chExt cx="0" cy="0"/>
+        </a:xfrm>
+      </p:grpSpPr>
+      <p:sp>
+        <p:nvSpPr>
+          <p:cNvPr id="2" name="Title 1">
+            <a:extLst>
+              <a:ext uri="{FF2B5EF4-FFF2-40B4-BE49-F238E27FC236}">
+                <a16:creationId xmlns:a16="http://schemas.microsoft.com/office/drawing/2014/main" id="{B83AED91-200C-B943-8C3D-624CD878A867}"/>
+              </a:ext>
+            </a:extLst>
+          </p:cNvPr>
+          <p:cNvSpPr>
+            <a:spLocks noGrp="1"/>
+          </p:cNvSpPr>
+          <p:nvPr>
+            <p:ph type="title"/>
+          </p:nvPr>
+        </p:nvSpPr>
+        <p:spPr/>
+        <p:txBody>
+          <a:bodyPr/>
+          <a:lstStyle/>
+          <a:p>
+            <a:r>
+              <a:rPr lang="en-US" dirty="0">
+                <a:latin typeface="IBM Plex Mono Light" panose="020B0409050203000203" pitchFamily="49" charset="77"/>
+              </a:rPr>
+              <a:t>Control Flow Statement </a:t>
+            </a:r>
+            <a:r>
+              <a:rPr lang="en-US" sz="1200" dirty="0">
+                <a:latin typeface="IBM Plex Mono Light" panose="020B0409050203000203" pitchFamily="49" charset="77"/>
+              </a:rPr>
+              <a:t>– while</a:t>
+            </a:r>
+            <a:endParaRPr lang="en-US" dirty="0">
+              <a:latin typeface="IBM Plex Mono Light" panose="020B0409050203000203" pitchFamily="49" charset="77"/>
+            </a:endParaRPr>
+          </a:p>
+        </p:txBody>
+      </p:sp>
+      <p:sp>
+        <p:nvSpPr>
+          <p:cNvPr id="3" name="Content Placeholder 2">
+            <a:extLst>
+              <a:ext uri="{FF2B5EF4-FFF2-40B4-BE49-F238E27FC236}">
+                <a16:creationId xmlns:a16="http://schemas.microsoft.com/office/drawing/2014/main" id="{92055E4C-5037-C643-8CDF-EE5F5A45DE0C}"/>
+              </a:ext>
+            </a:extLst>
+          </p:cNvPr>
+          <p:cNvSpPr>
+            <a:spLocks noGrp="1"/>
+          </p:cNvSpPr>
+          <p:nvPr>
+            <p:ph idx="1"/>
+          </p:nvPr>
+        </p:nvSpPr>
+        <p:spPr/>
+        <p:txBody>
+          <a:bodyPr>
+            <a:normAutofit/>
+          </a:bodyPr>
+          <a:lstStyle/>
+          <a:p>
+            <a:pPr marL="0" indent="0">
+              <a:buNone/>
+            </a:pPr>
+            <a:r>
+              <a:rPr lang="en-US" dirty="0">
+                <a:latin typeface="IBM Plex Mono Light" panose="020B0409050203000203" pitchFamily="49" charset="77"/>
+              </a:rPr>
+              <a:t>while &lt;condition&gt; {</a:t>
+            </a:r>
+          </a:p>
+          <a:p>
+            <a:pPr marL="0" indent="0">
+              <a:buNone/>
+            </a:pPr>
+            <a:r>
+              <a:rPr lang="en-US" dirty="0">
+                <a:latin typeface="IBM Plex Mono Light" panose="020B0409050203000203" pitchFamily="49" charset="77"/>
+              </a:rPr>
+              <a:t>	..</a:t>
+            </a:r>
+          </a:p>
+          <a:p>
+            <a:pPr marL="0" indent="0">
+              <a:buNone/>
+            </a:pPr>
+            <a:r>
+              <a:rPr lang="en-US" dirty="0">
+                <a:latin typeface="IBM Plex Mono Light" panose="020B0409050203000203" pitchFamily="49" charset="77"/>
+              </a:rPr>
+              <a:t>	..</a:t>
+            </a:r>
+          </a:p>
+          <a:p>
+            <a:pPr marL="0" indent="0">
+              <a:buNone/>
+            </a:pPr>
+            <a:r>
+              <a:rPr lang="en-US" dirty="0">
+                <a:latin typeface="IBM Plex Mono Light" panose="020B0409050203000203" pitchFamily="49" charset="77"/>
+              </a:rPr>
+              <a:t>}</a:t>
+            </a:r>
+          </a:p>
+        </p:txBody>
+      </p:sp>
+    </p:spTree>
+    <p:extLst>
+      <p:ext uri="{BB962C8B-B14F-4D97-AF65-F5344CB8AC3E}">
+        <p14:creationId xmlns:p14="http://schemas.microsoft.com/office/powerpoint/2010/main" val="3471205472"/>
+      </p:ext>
+    </p:extLst>
+  </p:cSld>
+  <p:clrMapOvr>
+    <a:masterClrMapping/>
+  </p:clrMapOvr>
+</p:sld>
+</file>
+
+<file path=ppt/slides/slide23.xml><?xml version="1.0" encoding="utf-8"?>
+<p:sld xmlns:a="http://schemas.openxmlformats.org/drawingml/2006/main" xmlns:r="http://schemas.openxmlformats.org/officeDocument/2006/relationships" xmlns:p="http://schemas.openxmlformats.org/presentationml/2006/main">
+  <p:cSld>
+    <p:spTree>
+      <p:nvGrpSpPr>
+        <p:cNvPr id="1" name=""/>
+        <p:cNvGrpSpPr/>
+        <p:nvPr/>
+      </p:nvGrpSpPr>
+      <p:grpSpPr>
+        <a:xfrm>
+          <a:off x="0" y="0"/>
+          <a:ext cx="0" cy="0"/>
+          <a:chOff x="0" y="0"/>
+          <a:chExt cx="0" cy="0"/>
+        </a:xfrm>
+      </p:grpSpPr>
+      <p:sp>
+        <p:nvSpPr>
+          <p:cNvPr id="2" name="Title 1">
+            <a:extLst>
+              <a:ext uri="{FF2B5EF4-FFF2-40B4-BE49-F238E27FC236}">
+                <a16:creationId xmlns:a16="http://schemas.microsoft.com/office/drawing/2014/main" id="{B83AED91-200C-B943-8C3D-624CD878A867}"/>
+              </a:ext>
+            </a:extLst>
+          </p:cNvPr>
+          <p:cNvSpPr>
+            <a:spLocks noGrp="1"/>
+          </p:cNvSpPr>
+          <p:nvPr>
+            <p:ph type="title"/>
+          </p:nvPr>
+        </p:nvSpPr>
+        <p:spPr/>
+        <p:txBody>
+          <a:bodyPr/>
+          <a:lstStyle/>
+          <a:p>
+            <a:r>
+              <a:rPr lang="en-US" dirty="0">
+                <a:latin typeface="IBM Plex Mono Light" panose="020B0409050203000203" pitchFamily="49" charset="77"/>
+              </a:rPr>
+              <a:t>Control Flow Statement </a:t>
+            </a:r>
+            <a:r>
+              <a:rPr lang="en-US" sz="1200" dirty="0">
+                <a:latin typeface="IBM Plex Mono Light" panose="020B0409050203000203" pitchFamily="49" charset="77"/>
+              </a:rPr>
+              <a:t>– for .. in ..</a:t>
+            </a:r>
+            <a:endParaRPr lang="en-US" dirty="0">
+              <a:latin typeface="IBM Plex Mono Light" panose="020B0409050203000203" pitchFamily="49" charset="77"/>
+            </a:endParaRPr>
+          </a:p>
+        </p:txBody>
+      </p:sp>
+      <p:sp>
+        <p:nvSpPr>
+          <p:cNvPr id="3" name="Content Placeholder 2">
+            <a:extLst>
+              <a:ext uri="{FF2B5EF4-FFF2-40B4-BE49-F238E27FC236}">
+                <a16:creationId xmlns:a16="http://schemas.microsoft.com/office/drawing/2014/main" id="{92055E4C-5037-C643-8CDF-EE5F5A45DE0C}"/>
+              </a:ext>
+            </a:extLst>
+          </p:cNvPr>
+          <p:cNvSpPr>
+            <a:spLocks noGrp="1"/>
+          </p:cNvSpPr>
+          <p:nvPr>
+            <p:ph idx="1"/>
+          </p:nvPr>
+        </p:nvSpPr>
+        <p:spPr/>
+        <p:txBody>
+          <a:bodyPr>
+            <a:normAutofit/>
+          </a:bodyPr>
+          <a:lstStyle/>
+          <a:p>
+            <a:pPr marL="0" indent="0">
+              <a:buNone/>
+            </a:pPr>
+            <a:r>
+              <a:rPr lang="en-US" dirty="0">
+                <a:latin typeface="IBM Plex Mono Light" panose="020B0409050203000203" pitchFamily="49" charset="77"/>
+              </a:rPr>
+              <a:t>for value in collection {</a:t>
+            </a:r>
+          </a:p>
+          <a:p>
+            <a:pPr marL="0" indent="0">
+              <a:buNone/>
+            </a:pPr>
+            <a:r>
+              <a:rPr lang="en-US" dirty="0">
+                <a:latin typeface="IBM Plex Mono Light" panose="020B0409050203000203" pitchFamily="49" charset="77"/>
+              </a:rPr>
+              <a:t>	.. .</a:t>
+            </a:r>
+          </a:p>
+          <a:p>
+            <a:pPr marL="0" indent="0">
+              <a:buNone/>
+            </a:pPr>
+            <a:r>
+              <a:rPr lang="en-US" dirty="0">
+                <a:latin typeface="IBM Plex Mono Light" panose="020B0409050203000203" pitchFamily="49" charset="77"/>
+              </a:rPr>
+              <a:t>	.. .</a:t>
+            </a:r>
+          </a:p>
+          <a:p>
+            <a:pPr marL="0" indent="0">
+              <a:buNone/>
+            </a:pPr>
+            <a:r>
+              <a:rPr lang="en-US" dirty="0">
+                <a:latin typeface="IBM Plex Mono Light" panose="020B0409050203000203" pitchFamily="49" charset="77"/>
+              </a:rPr>
+              <a:t>}</a:t>
+            </a:r>
+          </a:p>
+        </p:txBody>
+      </p:sp>
+    </p:spTree>
+    <p:extLst>
+      <p:ext uri="{BB962C8B-B14F-4D97-AF65-F5344CB8AC3E}">
+        <p14:creationId xmlns:p14="http://schemas.microsoft.com/office/powerpoint/2010/main" val="330772298"/>
+      </p:ext>
+    </p:extLst>
+  </p:cSld>
+  <p:clrMapOvr>
+    <a:masterClrMapping/>
+  </p:clrMapOvr>
+</p:sld>
+</file>
+
 <file path=ppt/slides/slide3.xml><?xml version="1.0" encoding="utf-8"?>
 <p:sld xmlns:a="http://schemas.openxmlformats.org/drawingml/2006/main" xmlns:r="http://schemas.openxmlformats.org/officeDocument/2006/relationships" xmlns:p="http://schemas.openxmlformats.org/presentationml/2006/main">
   <p:cSld>
@@ -13860,4 +16102,299 @@
     </a:ext>
   </a:extLst>
 </a:theme>
+</file>
+
+<file path=ppt/theme/theme2.xml><?xml version="1.0" encoding="utf-8"?>
+<a:theme xmlns:a="http://schemas.openxmlformats.org/drawingml/2006/main" name="Office Theme">
+  <a:themeElements>
+    <a:clrScheme name="Office">
+      <a:dk1>
+        <a:sysClr val="windowText" lastClr="000000"/>
+      </a:dk1>
+      <a:lt1>
+        <a:sysClr val="window" lastClr="FFFFFF"/>
+      </a:lt1>
+      <a:dk2>
+        <a:srgbClr val="44546A"/>
+      </a:dk2>
+      <a:lt2>
+        <a:srgbClr val="E7E6E6"/>
+      </a:lt2>
+      <a:accent1>
+        <a:srgbClr val="4472C4"/>
+      </a:accent1>
+      <a:accent2>
+        <a:srgbClr val="ED7D31"/>
+      </a:accent2>
+      <a:accent3>
+        <a:srgbClr val="A5A5A5"/>
+      </a:accent3>
+      <a:accent4>
+        <a:srgbClr val="FFC000"/>
+      </a:accent4>
+      <a:accent5>
+        <a:srgbClr val="5B9BD5"/>
+      </a:accent5>
+      <a:accent6>
+        <a:srgbClr val="70AD47"/>
+      </a:accent6>
+      <a:hlink>
+        <a:srgbClr val="0563C1"/>
+      </a:hlink>
+      <a:folHlink>
+        <a:srgbClr val="954F72"/>
+      </a:folHlink>
+    </a:clrScheme>
+    <a:fontScheme name="Office">
+      <a:majorFont>
+        <a:latin typeface="Calibri Light" panose="020F0302020204030204"/>
+        <a:ea typeface=""/>
+        <a:cs typeface=""/>
+        <a:font script="Jpan" typeface="游ゴシック Light"/>
+        <a:font script="Hang" typeface="맑은 고딕"/>
+        <a:font script="Hans" typeface="等线 Light"/>
+        <a:font script="Hant" typeface="新細明體"/>
+        <a:font script="Arab" typeface="Times New Roman"/>
+        <a:font script="Hebr" typeface="Times New Roman"/>
+        <a:font script="Thai" typeface="Angsana New"/>
+        <a:font script="Ethi" typeface="Nyala"/>
+        <a:font script="Beng" typeface="Vrinda"/>
+        <a:font script="Gujr" typeface="Shruti"/>
+        <a:font script="Khmr" typeface="MoolBoran"/>
+        <a:font script="Knda" typeface="Tunga"/>
+        <a:font script="Guru" typeface="Raavi"/>
+        <a:font script="Cans" typeface="Euphemia"/>
+        <a:font script="Cher" typeface="Plantagenet Cherokee"/>
+        <a:font script="Yiii" typeface="Microsoft Yi Baiti"/>
+        <a:font script="Tibt" typeface="Microsoft Himalaya"/>
+        <a:font script="Thaa" typeface="MV Boli"/>
+        <a:font script="Deva" typeface="Mangal"/>
+        <a:font script="Telu" typeface="Gautami"/>
+        <a:font script="Taml" typeface="Latha"/>
+        <a:font script="Syrc" typeface="Estrangelo Edessa"/>
+        <a:font script="Orya" typeface="Kalinga"/>
+        <a:font script="Mlym" typeface="Kartika"/>
+        <a:font script="Laoo" typeface="DokChampa"/>
+        <a:font script="Sinh" typeface="Iskoola Pota"/>
+        <a:font script="Mong" typeface="Mongolian Baiti"/>
+        <a:font script="Viet" typeface="Times New Roman"/>
+        <a:font script="Uigh" typeface="Microsoft Uighur"/>
+        <a:font script="Geor" typeface="Sylfaen"/>
+        <a:font script="Armn" typeface="Arial"/>
+        <a:font script="Bugi" typeface="Leelawadee UI"/>
+        <a:font script="Bopo" typeface="Microsoft JhengHei"/>
+        <a:font script="Java" typeface="Javanese Text"/>
+        <a:font script="Lisu" typeface="Segoe UI"/>
+        <a:font script="Mymr" typeface="Myanmar Text"/>
+        <a:font script="Nkoo" typeface="Ebrima"/>
+        <a:font script="Olck" typeface="Nirmala UI"/>
+        <a:font script="Osma" typeface="Ebrima"/>
+        <a:font script="Phag" typeface="Phagspa"/>
+        <a:font script="Syrn" typeface="Estrangelo Edessa"/>
+        <a:font script="Syrj" typeface="Estrangelo Edessa"/>
+        <a:font script="Syre" typeface="Estrangelo Edessa"/>
+        <a:font script="Sora" typeface="Nirmala UI"/>
+        <a:font script="Tale" typeface="Microsoft Tai Le"/>
+        <a:font script="Talu" typeface="Microsoft New Tai Lue"/>
+        <a:font script="Tfng" typeface="Ebrima"/>
+      </a:majorFont>
+      <a:minorFont>
+        <a:latin typeface="Calibri" panose="020F0502020204030204"/>
+        <a:ea typeface=""/>
+        <a:cs typeface=""/>
+        <a:font script="Jpan" typeface="游ゴシック"/>
+        <a:font script="Hang" typeface="맑은 고딕"/>
+        <a:font script="Hans" typeface="等线"/>
+        <a:font script="Hant" typeface="新細明體"/>
+        <a:font script="Arab" typeface="Arial"/>
+        <a:font script="Hebr" typeface="Arial"/>
+        <a:font script="Thai" typeface="Cordia New"/>
+        <a:font script="Ethi" typeface="Nyala"/>
+        <a:font script="Beng" typeface="Vrinda"/>
+        <a:font script="Gujr" typeface="Shruti"/>
+        <a:font script="Khmr" typeface="DaunPenh"/>
+        <a:font script="Knda" typeface="Tunga"/>
+        <a:font script="Guru" typeface="Raavi"/>
+        <a:font script="Cans" typeface="Euphemia"/>
+        <a:font script="Cher" typeface="Plantagenet Cherokee"/>
+        <a:font script="Yiii" typeface="Microsoft Yi Baiti"/>
+        <a:font script="Tibt" typeface="Microsoft Himalaya"/>
+        <a:font script="Thaa" typeface="MV Boli"/>
+        <a:font script="Deva" typeface="Mangal"/>
+        <a:font script="Telu" typeface="Gautami"/>
+        <a:font script="Taml" typeface="Latha"/>
+        <a:font script="Syrc" typeface="Estrangelo Edessa"/>
+        <a:font script="Orya" typeface="Kalinga"/>
+        <a:font script="Mlym" typeface="Kartika"/>
+        <a:font script="Laoo" typeface="DokChampa"/>
+        <a:font script="Sinh" typeface="Iskoola Pota"/>
+        <a:font script="Mong" typeface="Mongolian Baiti"/>
+        <a:font script="Viet" typeface="Arial"/>
+        <a:font script="Uigh" typeface="Microsoft Uighur"/>
+        <a:font script="Geor" typeface="Sylfaen"/>
+        <a:font script="Armn" typeface="Arial"/>
+        <a:font script="Bugi" typeface="Leelawadee UI"/>
+        <a:font script="Bopo" typeface="Microsoft JhengHei"/>
+        <a:font script="Java" typeface="Javanese Text"/>
+        <a:font script="Lisu" typeface="Segoe UI"/>
+        <a:font script="Mymr" typeface="Myanmar Text"/>
+        <a:font script="Nkoo" typeface="Ebrima"/>
+        <a:font script="Olck" typeface="Nirmala UI"/>
+        <a:font script="Osma" typeface="Ebrima"/>
+        <a:font script="Phag" typeface="Phagspa"/>
+        <a:font script="Syrn" typeface="Estrangelo Edessa"/>
+        <a:font script="Syrj" typeface="Estrangelo Edessa"/>
+        <a:font script="Syre" typeface="Estrangelo Edessa"/>
+        <a:font script="Sora" typeface="Nirmala UI"/>
+        <a:font script="Tale" typeface="Microsoft Tai Le"/>
+        <a:font script="Talu" typeface="Microsoft New Tai Lue"/>
+        <a:font script="Tfng" typeface="Ebrima"/>
+      </a:minorFont>
+    </a:fontScheme>
+    <a:fmtScheme name="Office">
+      <a:fillStyleLst>
+        <a:solidFill>
+          <a:schemeClr val="phClr"/>
+        </a:solidFill>
+        <a:gradFill rotWithShape="1">
+          <a:gsLst>
+            <a:gs pos="0">
+              <a:schemeClr val="phClr">
+                <a:lumMod val="110000"/>
+                <a:satMod val="105000"/>
+                <a:tint val="67000"/>
+              </a:schemeClr>
+            </a:gs>
+            <a:gs pos="50000">
+              <a:schemeClr val="phClr">
+                <a:lumMod val="105000"/>
+                <a:satMod val="103000"/>
+                <a:tint val="73000"/>
+              </a:schemeClr>
+            </a:gs>
+            <a:gs pos="100000">
+              <a:schemeClr val="phClr">
+                <a:lumMod val="105000"/>
+                <a:satMod val="109000"/>
+                <a:tint val="81000"/>
+              </a:schemeClr>
+            </a:gs>
+          </a:gsLst>
+          <a:lin ang="5400000" scaled="0"/>
+        </a:gradFill>
+        <a:gradFill rotWithShape="1">
+          <a:gsLst>
+            <a:gs pos="0">
+              <a:schemeClr val="phClr">
+                <a:satMod val="103000"/>
+                <a:lumMod val="102000"/>
+                <a:tint val="94000"/>
+              </a:schemeClr>
+            </a:gs>
+            <a:gs pos="50000">
+              <a:schemeClr val="phClr">
+                <a:satMod val="110000"/>
+                <a:lumMod val="100000"/>
+                <a:shade val="100000"/>
+              </a:schemeClr>
+            </a:gs>
+            <a:gs pos="100000">
+              <a:schemeClr val="phClr">
+                <a:lumMod val="99000"/>
+                <a:satMod val="120000"/>
+                <a:shade val="78000"/>
+              </a:schemeClr>
+            </a:gs>
+          </a:gsLst>
+          <a:lin ang="5400000" scaled="0"/>
+        </a:gradFill>
+      </a:fillStyleLst>
+      <a:lnStyleLst>
+        <a:ln w="6350" cap="flat" cmpd="sng" algn="ctr">
+          <a:solidFill>
+            <a:schemeClr val="phClr"/>
+          </a:solidFill>
+          <a:prstDash val="solid"/>
+          <a:miter lim="800000"/>
+        </a:ln>
+        <a:ln w="12700" cap="flat" cmpd="sng" algn="ctr">
+          <a:solidFill>
+            <a:schemeClr val="phClr"/>
+          </a:solidFill>
+          <a:prstDash val="solid"/>
+          <a:miter lim="800000"/>
+        </a:ln>
+        <a:ln w="19050" cap="flat" cmpd="sng" algn="ctr">
+          <a:solidFill>
+            <a:schemeClr val="phClr"/>
+          </a:solidFill>
+          <a:prstDash val="solid"/>
+          <a:miter lim="800000"/>
+        </a:ln>
+      </a:lnStyleLst>
+      <a:effectStyleLst>
+        <a:effectStyle>
+          <a:effectLst/>
+        </a:effectStyle>
+        <a:effectStyle>
+          <a:effectLst/>
+        </a:effectStyle>
+        <a:effectStyle>
+          <a:effectLst>
+            <a:outerShdw blurRad="57150" dist="19050" dir="5400000" algn="ctr" rotWithShape="0">
+              <a:srgbClr val="000000">
+                <a:alpha val="63000"/>
+              </a:srgbClr>
+            </a:outerShdw>
+          </a:effectLst>
+        </a:effectStyle>
+      </a:effectStyleLst>
+      <a:bgFillStyleLst>
+        <a:solidFill>
+          <a:schemeClr val="phClr"/>
+        </a:solidFill>
+        <a:solidFill>
+          <a:schemeClr val="phClr">
+            <a:tint val="95000"/>
+            <a:satMod val="170000"/>
+          </a:schemeClr>
+        </a:solidFill>
+        <a:gradFill rotWithShape="1">
+          <a:gsLst>
+            <a:gs pos="0">
+              <a:schemeClr val="phClr">
+                <a:tint val="93000"/>
+                <a:satMod val="150000"/>
+                <a:shade val="98000"/>
+                <a:lumMod val="102000"/>
+              </a:schemeClr>
+            </a:gs>
+            <a:gs pos="50000">
+              <a:schemeClr val="phClr">
+                <a:tint val="98000"/>
+                <a:satMod val="130000"/>
+                <a:shade val="90000"/>
+                <a:lumMod val="103000"/>
+              </a:schemeClr>
+            </a:gs>
+            <a:gs pos="100000">
+              <a:schemeClr val="phClr">
+                <a:shade val="63000"/>
+                <a:satMod val="120000"/>
+              </a:schemeClr>
+            </a:gs>
+          </a:gsLst>
+          <a:lin ang="5400000" scaled="0"/>
+        </a:gradFill>
+      </a:bgFillStyleLst>
+    </a:fmtScheme>
+  </a:themeElements>
+  <a:objectDefaults/>
+  <a:extraClrSchemeLst/>
+  <a:extLst>
+    <a:ext uri="{05A4C25C-085E-4340-85A3-A5531E510DB2}">
+      <thm15:themeFamily xmlns:thm15="http://schemas.microsoft.com/office/thememl/2012/main" name="Office Theme" id="{62F939B6-93AF-4DB8-9C6B-D6C7DFDC589F}" vid="{4A3C46E8-61CC-4603-A589-7422A47A8E4A}"/>
+    </a:ext>
+  </a:extLst>
+</a:theme>
 </file>
</xml_diff>